<commit_message>
Add: DoD, DoR, Presentation
</commit_message>
<xml_diff>
--- a/dokumenty/prezentace_rsp1.pptx
+++ b/dokumenty/prezentace_rsp1.pptx
@@ -10,8 +10,12 @@
     <p:sldId id="258" r:id="rId7"/>
     <p:sldId id="259" r:id="rId8"/>
     <p:sldId id="261" r:id="rId9"/>
-    <p:sldId id="262" r:id="rId10"/>
-    <p:sldId id="263" r:id="rId11"/>
+    <p:sldId id="266" r:id="rId10"/>
+    <p:sldId id="262" r:id="rId11"/>
+    <p:sldId id="264" r:id="rId12"/>
+    <p:sldId id="265" r:id="rId13"/>
+    <p:sldId id="267" r:id="rId14"/>
+    <p:sldId id="263" r:id="rId15"/>
   </p:sldIdLst>
   <p:sldSz cx="12192000" cy="6858000"/>
   <p:notesSz cx="6858000" cy="9144000"/>
@@ -121,937 +125,9 @@
 <file path=ppt/revisionInfo.xml><?xml version="1.0" encoding="utf-8"?>
 <p1510:revInfo xmlns:a="http://schemas.openxmlformats.org/drawingml/2006/main" xmlns:r="http://schemas.openxmlformats.org/officeDocument/2006/relationships" xmlns:p1510="http://schemas.microsoft.com/office/powerpoint/2015/10/main">
   <p1510:revLst>
-    <p1510:client id="{22F06AAD-36C1-4528-ADB2-F94FB2319575}" v="1303" dt="2020-11-05T17:03:21.446"/>
-    <p1510:client id="{6F7FDFBA-89CE-4A86-BCCE-E48FC4237A03}" v="59" dt="2020-11-05T17:13:13.711"/>
-    <p1510:client id="{BDFE91C9-5A9F-4516-9910-04AB08935AA4}" v="1712" dt="2020-11-05T17:53:17.157"/>
-    <p1510:client id="{C41F27FD-2CE2-45C4-9C86-675CDA62708E}" v="428" dt="2020-11-05T17:53:31.919"/>
-    <p1510:client id="{F1D3B50D-3688-427B-B0AC-B3E6ADBAA1AB}" v="175" dt="2020-11-05T15:44:20.983"/>
+    <p1510:client id="{9E93349C-E3FE-436B-95E7-125AEEB29347}" v="119" dt="2020-12-02T08:20:01.612"/>
   </p1510:revLst>
 </p1510:revInfo>
-</file>
-
-<file path=ppt/changesInfos/changesInfo1.xml><?xml version="1.0" encoding="utf-8"?>
-<pc:chgInfo xmlns:a="http://schemas.openxmlformats.org/drawingml/2006/main" xmlns:r="http://schemas.openxmlformats.org/officeDocument/2006/relationships" xmlns:ac="http://schemas.microsoft.com/office/drawing/2013/main/command" xmlns:pc="http://schemas.microsoft.com/office/powerpoint/2013/main/command">
-  <pc:docChgLst>
-    <pc:chgData name="Martin Linka" userId="S::linka@student.vspj.cz::6ac17739-01f6-41b6-b551-05cfd3691ae0" providerId="AD" clId="Web-{BDFE91C9-5A9F-4516-9910-04AB08935AA4}"/>
-    <pc:docChg chg="addSld delSld modSld">
-      <pc:chgData name="Martin Linka" userId="S::linka@student.vspj.cz::6ac17739-01f6-41b6-b551-05cfd3691ae0" providerId="AD" clId="Web-{BDFE91C9-5A9F-4516-9910-04AB08935AA4}" dt="2020-11-05T17:53:16.564" v="1703" actId="20577"/>
-      <pc:docMkLst>
-        <pc:docMk/>
-      </pc:docMkLst>
-      <pc:sldChg chg="modSp">
-        <pc:chgData name="Martin Linka" userId="S::linka@student.vspj.cz::6ac17739-01f6-41b6-b551-05cfd3691ae0" providerId="AD" clId="Web-{BDFE91C9-5A9F-4516-9910-04AB08935AA4}" dt="2020-11-05T17:45:49.210" v="1209" actId="20577"/>
-        <pc:sldMkLst>
-          <pc:docMk/>
-          <pc:sldMk cId="2751309796" sldId="257"/>
-        </pc:sldMkLst>
-        <pc:spChg chg="mod">
-          <ac:chgData name="Martin Linka" userId="S::linka@student.vspj.cz::6ac17739-01f6-41b6-b551-05cfd3691ae0" providerId="AD" clId="Web-{BDFE91C9-5A9F-4516-9910-04AB08935AA4}" dt="2020-11-05T17:45:49.210" v="1209" actId="20577"/>
-          <ac:spMkLst>
-            <pc:docMk/>
-            <pc:sldMk cId="2751309796" sldId="257"/>
-            <ac:spMk id="3" creationId="{2553469C-DF1D-4C4F-83B9-240140DFC0FA}"/>
-          </ac:spMkLst>
-        </pc:spChg>
-      </pc:sldChg>
-      <pc:sldChg chg="modSp">
-        <pc:chgData name="Martin Linka" userId="S::linka@student.vspj.cz::6ac17739-01f6-41b6-b551-05cfd3691ae0" providerId="AD" clId="Web-{BDFE91C9-5A9F-4516-9910-04AB08935AA4}" dt="2020-11-05T17:48:07.478" v="1371" actId="20577"/>
-        <pc:sldMkLst>
-          <pc:docMk/>
-          <pc:sldMk cId="2473264053" sldId="259"/>
-        </pc:sldMkLst>
-        <pc:spChg chg="mod">
-          <ac:chgData name="Martin Linka" userId="S::linka@student.vspj.cz::6ac17739-01f6-41b6-b551-05cfd3691ae0" providerId="AD" clId="Web-{BDFE91C9-5A9F-4516-9910-04AB08935AA4}" dt="2020-11-05T17:48:07.478" v="1371" actId="20577"/>
-          <ac:spMkLst>
-            <pc:docMk/>
-            <pc:sldMk cId="2473264053" sldId="259"/>
-            <ac:spMk id="3" creationId="{2553469C-DF1D-4C4F-83B9-240140DFC0FA}"/>
-          </ac:spMkLst>
-        </pc:spChg>
-      </pc:sldChg>
-      <pc:sldChg chg="del">
-        <pc:chgData name="Martin Linka" userId="S::linka@student.vspj.cz::6ac17739-01f6-41b6-b551-05cfd3691ae0" providerId="AD" clId="Web-{BDFE91C9-5A9F-4516-9910-04AB08935AA4}" dt="2020-11-05T17:43:37.754" v="992"/>
-        <pc:sldMkLst>
-          <pc:docMk/>
-          <pc:sldMk cId="693303209" sldId="260"/>
-        </pc:sldMkLst>
-      </pc:sldChg>
-      <pc:sldChg chg="addSp delSp modSp add replId">
-        <pc:chgData name="Martin Linka" userId="S::linka@student.vspj.cz::6ac17739-01f6-41b6-b551-05cfd3691ae0" providerId="AD" clId="Web-{BDFE91C9-5A9F-4516-9910-04AB08935AA4}" dt="2020-11-05T17:49:43.887" v="1666" actId="20577"/>
-        <pc:sldMkLst>
-          <pc:docMk/>
-          <pc:sldMk cId="2297976011" sldId="261"/>
-        </pc:sldMkLst>
-        <pc:spChg chg="mod">
-          <ac:chgData name="Martin Linka" userId="S::linka@student.vspj.cz::6ac17739-01f6-41b6-b551-05cfd3691ae0" providerId="AD" clId="Web-{BDFE91C9-5A9F-4516-9910-04AB08935AA4}" dt="2020-11-05T17:32:46.785" v="484" actId="20577"/>
-          <ac:spMkLst>
-            <pc:docMk/>
-            <pc:sldMk cId="2297976011" sldId="261"/>
-            <ac:spMk id="2" creationId="{42D9A6D5-8C69-4578-BB48-2877A7E0A6FD}"/>
-          </ac:spMkLst>
-        </pc:spChg>
-        <pc:spChg chg="mod">
-          <ac:chgData name="Martin Linka" userId="S::linka@student.vspj.cz::6ac17739-01f6-41b6-b551-05cfd3691ae0" providerId="AD" clId="Web-{BDFE91C9-5A9F-4516-9910-04AB08935AA4}" dt="2020-11-05T17:49:43.887" v="1666" actId="20577"/>
-          <ac:spMkLst>
-            <pc:docMk/>
-            <pc:sldMk cId="2297976011" sldId="261"/>
-            <ac:spMk id="5" creationId="{F0005D57-43A1-4BA3-98F1-286F00E1A708}"/>
-          </ac:spMkLst>
-        </pc:spChg>
-        <pc:spChg chg="add del mod">
-          <ac:chgData name="Martin Linka" userId="S::linka@student.vspj.cz::6ac17739-01f6-41b6-b551-05cfd3691ae0" providerId="AD" clId="Web-{BDFE91C9-5A9F-4516-9910-04AB08935AA4}" dt="2020-11-05T17:39:40.889" v="488"/>
-          <ac:spMkLst>
-            <pc:docMk/>
-            <pc:sldMk cId="2297976011" sldId="261"/>
-            <ac:spMk id="6" creationId="{C2A552A9-D300-4413-B0B9-82EF84F4EAAD}"/>
-          </ac:spMkLst>
-        </pc:spChg>
-        <pc:picChg chg="del">
-          <ac:chgData name="Martin Linka" userId="S::linka@student.vspj.cz::6ac17739-01f6-41b6-b551-05cfd3691ae0" providerId="AD" clId="Web-{BDFE91C9-5A9F-4516-9910-04AB08935AA4}" dt="2020-11-05T17:35:33.071" v="487"/>
-          <ac:picMkLst>
-            <pc:docMk/>
-            <pc:sldMk cId="2297976011" sldId="261"/>
-            <ac:picMk id="4" creationId="{A8C580A4-5EC2-4DC6-8ECA-AD9A41D1B30A}"/>
-          </ac:picMkLst>
-        </pc:picChg>
-        <pc:picChg chg="add mod ord">
-          <ac:chgData name="Martin Linka" userId="S::linka@student.vspj.cz::6ac17739-01f6-41b6-b551-05cfd3691ae0" providerId="AD" clId="Web-{BDFE91C9-5A9F-4516-9910-04AB08935AA4}" dt="2020-11-05T17:39:54.717" v="494" actId="1076"/>
-          <ac:picMkLst>
-            <pc:docMk/>
-            <pc:sldMk cId="2297976011" sldId="261"/>
-            <ac:picMk id="7" creationId="{A9025511-1327-4CC0-BDF1-F09E81EED05B}"/>
-          </ac:picMkLst>
-        </pc:picChg>
-      </pc:sldChg>
-      <pc:sldChg chg="addSp delSp modSp add replId">
-        <pc:chgData name="Martin Linka" userId="S::linka@student.vspj.cz::6ac17739-01f6-41b6-b551-05cfd3691ae0" providerId="AD" clId="Web-{BDFE91C9-5A9F-4516-9910-04AB08935AA4}" dt="2020-11-05T17:50:08.950" v="1675" actId="20577"/>
-        <pc:sldMkLst>
-          <pc:docMk/>
-          <pc:sldMk cId="1881435807" sldId="262"/>
-        </pc:sldMkLst>
-        <pc:spChg chg="mod">
-          <ac:chgData name="Martin Linka" userId="S::linka@student.vspj.cz::6ac17739-01f6-41b6-b551-05cfd3691ae0" providerId="AD" clId="Web-{BDFE91C9-5A9F-4516-9910-04AB08935AA4}" dt="2020-11-05T17:50:08.950" v="1675" actId="20577"/>
-          <ac:spMkLst>
-            <pc:docMk/>
-            <pc:sldMk cId="1881435807" sldId="262"/>
-            <ac:spMk id="2" creationId="{42D9A6D5-8C69-4578-BB48-2877A7E0A6FD}"/>
-          </ac:spMkLst>
-        </pc:spChg>
-        <pc:spChg chg="add mod">
-          <ac:chgData name="Martin Linka" userId="S::linka@student.vspj.cz::6ac17739-01f6-41b6-b551-05cfd3691ae0" providerId="AD" clId="Web-{BDFE91C9-5A9F-4516-9910-04AB08935AA4}" dt="2020-11-05T17:50:00.512" v="1669"/>
-          <ac:spMkLst>
-            <pc:docMk/>
-            <pc:sldMk cId="1881435807" sldId="262"/>
-            <ac:spMk id="4" creationId="{52DFB3D5-8584-4E5C-8A24-CB2537B02B16}"/>
-          </ac:spMkLst>
-        </pc:spChg>
-        <pc:spChg chg="del">
-          <ac:chgData name="Martin Linka" userId="S::linka@student.vspj.cz::6ac17739-01f6-41b6-b551-05cfd3691ae0" providerId="AD" clId="Web-{BDFE91C9-5A9F-4516-9910-04AB08935AA4}" dt="2020-11-05T17:50:00.512" v="1669"/>
-          <ac:spMkLst>
-            <pc:docMk/>
-            <pc:sldMk cId="1881435807" sldId="262"/>
-            <ac:spMk id="5" creationId="{F0005D57-43A1-4BA3-98F1-286F00E1A708}"/>
-          </ac:spMkLst>
-        </pc:spChg>
-        <pc:spChg chg="add mod">
-          <ac:chgData name="Martin Linka" userId="S::linka@student.vspj.cz::6ac17739-01f6-41b6-b551-05cfd3691ae0" providerId="AD" clId="Web-{BDFE91C9-5A9F-4516-9910-04AB08935AA4}" dt="2020-11-05T17:50:04.262" v="1670"/>
-          <ac:spMkLst>
-            <pc:docMk/>
-            <pc:sldMk cId="1881435807" sldId="262"/>
-            <ac:spMk id="8" creationId="{74D53889-CE4D-4E41-8305-EEFBEDEF1603}"/>
-          </ac:spMkLst>
-        </pc:spChg>
-        <pc:picChg chg="del">
-          <ac:chgData name="Martin Linka" userId="S::linka@student.vspj.cz::6ac17739-01f6-41b6-b551-05cfd3691ae0" providerId="AD" clId="Web-{BDFE91C9-5A9F-4516-9910-04AB08935AA4}" dt="2020-11-05T17:50:04.262" v="1670"/>
-          <ac:picMkLst>
-            <pc:docMk/>
-            <pc:sldMk cId="1881435807" sldId="262"/>
-            <ac:picMk id="7" creationId="{A9025511-1327-4CC0-BDF1-F09E81EED05B}"/>
-          </ac:picMkLst>
-        </pc:picChg>
-      </pc:sldChg>
-      <pc:sldChg chg="modSp add replId">
-        <pc:chgData name="Martin Linka" userId="S::linka@student.vspj.cz::6ac17739-01f6-41b6-b551-05cfd3691ae0" providerId="AD" clId="Web-{BDFE91C9-5A9F-4516-9910-04AB08935AA4}" dt="2020-11-05T17:53:15.173" v="1701" actId="20577"/>
-        <pc:sldMkLst>
-          <pc:docMk/>
-          <pc:sldMk cId="1140955540" sldId="263"/>
-        </pc:sldMkLst>
-        <pc:spChg chg="mod">
-          <ac:chgData name="Martin Linka" userId="S::linka@student.vspj.cz::6ac17739-01f6-41b6-b551-05cfd3691ae0" providerId="AD" clId="Web-{BDFE91C9-5A9F-4516-9910-04AB08935AA4}" dt="2020-11-05T17:53:15.173" v="1701" actId="20577"/>
-          <ac:spMkLst>
-            <pc:docMk/>
-            <pc:sldMk cId="1140955540" sldId="263"/>
-            <ac:spMk id="2" creationId="{42D9A6D5-8C69-4578-BB48-2877A7E0A6FD}"/>
-          </ac:spMkLst>
-        </pc:spChg>
-      </pc:sldChg>
-    </pc:docChg>
-  </pc:docChgLst>
-  <pc:docChgLst>
-    <pc:chgData name="Martin Linka" userId="S::linka@student.vspj.cz::6ac17739-01f6-41b6-b551-05cfd3691ae0" providerId="AD" clId="Web-{F1D3B50D-3688-427B-B0AC-B3E6ADBAA1AB}"/>
-    <pc:docChg chg="addSld modSld">
-      <pc:chgData name="Martin Linka" userId="S::linka@student.vspj.cz::6ac17739-01f6-41b6-b551-05cfd3691ae0" providerId="AD" clId="Web-{F1D3B50D-3688-427B-B0AC-B3E6ADBAA1AB}" dt="2020-11-05T15:44:20.983" v="169"/>
-      <pc:docMkLst>
-        <pc:docMk/>
-      </pc:docMkLst>
-      <pc:sldChg chg="modSp">
-        <pc:chgData name="Martin Linka" userId="S::linka@student.vspj.cz::6ac17739-01f6-41b6-b551-05cfd3691ae0" providerId="AD" clId="Web-{F1D3B50D-3688-427B-B0AC-B3E6ADBAA1AB}" dt="2020-11-05T15:41:55.448" v="30" actId="20577"/>
-        <pc:sldMkLst>
-          <pc:docMk/>
-          <pc:sldMk cId="3799523001" sldId="256"/>
-        </pc:sldMkLst>
-        <pc:spChg chg="mod">
-          <ac:chgData name="Martin Linka" userId="S::linka@student.vspj.cz::6ac17739-01f6-41b6-b551-05cfd3691ae0" providerId="AD" clId="Web-{F1D3B50D-3688-427B-B0AC-B3E6ADBAA1AB}" dt="2020-11-05T15:41:55.448" v="30" actId="20577"/>
-          <ac:spMkLst>
-            <pc:docMk/>
-            <pc:sldMk cId="3799523001" sldId="256"/>
-            <ac:spMk id="2" creationId="{00000000-0000-0000-0000-000000000000}"/>
-          </ac:spMkLst>
-        </pc:spChg>
-      </pc:sldChg>
-      <pc:sldChg chg="modSp new">
-        <pc:chgData name="Martin Linka" userId="S::linka@student.vspj.cz::6ac17739-01f6-41b6-b551-05cfd3691ae0" providerId="AD" clId="Web-{F1D3B50D-3688-427B-B0AC-B3E6ADBAA1AB}" dt="2020-11-05T15:43:48.248" v="146" actId="20577"/>
-        <pc:sldMkLst>
-          <pc:docMk/>
-          <pc:sldMk cId="2751309796" sldId="257"/>
-        </pc:sldMkLst>
-        <pc:spChg chg="mod">
-          <ac:chgData name="Martin Linka" userId="S::linka@student.vspj.cz::6ac17739-01f6-41b6-b551-05cfd3691ae0" providerId="AD" clId="Web-{F1D3B50D-3688-427B-B0AC-B3E6ADBAA1AB}" dt="2020-11-05T15:41:28.291" v="11" actId="20577"/>
-          <ac:spMkLst>
-            <pc:docMk/>
-            <pc:sldMk cId="2751309796" sldId="257"/>
-            <ac:spMk id="2" creationId="{42D9A6D5-8C69-4578-BB48-2877A7E0A6FD}"/>
-          </ac:spMkLst>
-        </pc:spChg>
-        <pc:spChg chg="mod">
-          <ac:chgData name="Martin Linka" userId="S::linka@student.vspj.cz::6ac17739-01f6-41b6-b551-05cfd3691ae0" providerId="AD" clId="Web-{F1D3B50D-3688-427B-B0AC-B3E6ADBAA1AB}" dt="2020-11-05T15:43:48.248" v="146" actId="20577"/>
-          <ac:spMkLst>
-            <pc:docMk/>
-            <pc:sldMk cId="2751309796" sldId="257"/>
-            <ac:spMk id="3" creationId="{2553469C-DF1D-4C4F-83B9-240140DFC0FA}"/>
-          </ac:spMkLst>
-        </pc:spChg>
-      </pc:sldChg>
-      <pc:sldChg chg="modSp add replId">
-        <pc:chgData name="Martin Linka" userId="S::linka@student.vspj.cz::6ac17739-01f6-41b6-b551-05cfd3691ae0" providerId="AD" clId="Web-{F1D3B50D-3688-427B-B0AC-B3E6ADBAA1AB}" dt="2020-11-05T15:43:56.295" v="154" actId="20577"/>
-        <pc:sldMkLst>
-          <pc:docMk/>
-          <pc:sldMk cId="4064850815" sldId="258"/>
-        </pc:sldMkLst>
-        <pc:spChg chg="mod">
-          <ac:chgData name="Martin Linka" userId="S::linka@student.vspj.cz::6ac17739-01f6-41b6-b551-05cfd3691ae0" providerId="AD" clId="Web-{F1D3B50D-3688-427B-B0AC-B3E6ADBAA1AB}" dt="2020-11-05T15:43:56.295" v="154" actId="20577"/>
-          <ac:spMkLst>
-            <pc:docMk/>
-            <pc:sldMk cId="4064850815" sldId="258"/>
-            <ac:spMk id="2" creationId="{42D9A6D5-8C69-4578-BB48-2877A7E0A6FD}"/>
-          </ac:spMkLst>
-        </pc:spChg>
-      </pc:sldChg>
-      <pc:sldChg chg="modSp add replId">
-        <pc:chgData name="Martin Linka" userId="S::linka@student.vspj.cz::6ac17739-01f6-41b6-b551-05cfd3691ae0" providerId="AD" clId="Web-{F1D3B50D-3688-427B-B0AC-B3E6ADBAA1AB}" dt="2020-11-05T15:44:17.405" v="166" actId="20577"/>
-        <pc:sldMkLst>
-          <pc:docMk/>
-          <pc:sldMk cId="2473264053" sldId="259"/>
-        </pc:sldMkLst>
-        <pc:spChg chg="mod">
-          <ac:chgData name="Martin Linka" userId="S::linka@student.vspj.cz::6ac17739-01f6-41b6-b551-05cfd3691ae0" providerId="AD" clId="Web-{F1D3B50D-3688-427B-B0AC-B3E6ADBAA1AB}" dt="2020-11-05T15:44:17.405" v="166" actId="20577"/>
-          <ac:spMkLst>
-            <pc:docMk/>
-            <pc:sldMk cId="2473264053" sldId="259"/>
-            <ac:spMk id="2" creationId="{42D9A6D5-8C69-4578-BB48-2877A7E0A6FD}"/>
-          </ac:spMkLst>
-        </pc:spChg>
-      </pc:sldChg>
-      <pc:sldChg chg="add replId">
-        <pc:chgData name="Martin Linka" userId="S::linka@student.vspj.cz::6ac17739-01f6-41b6-b551-05cfd3691ae0" providerId="AD" clId="Web-{F1D3B50D-3688-427B-B0AC-B3E6ADBAA1AB}" dt="2020-11-05T15:44:20.983" v="169"/>
-        <pc:sldMkLst>
-          <pc:docMk/>
-          <pc:sldMk cId="693303209" sldId="260"/>
-        </pc:sldMkLst>
-      </pc:sldChg>
-    </pc:docChg>
-  </pc:docChgLst>
-  <pc:docChgLst>
-    <pc:chgData name="Martin Doležal" userId="S::doleza92@student.vspj.cz::294b6a91-341d-4214-a2f9-73ba102f4c39" providerId="AD" clId="Web-{C41F27FD-2CE2-45C4-9C86-675CDA62708E}"/>
-    <pc:docChg chg="modSld">
-      <pc:chgData name="Martin Doležal" userId="S::doleza92@student.vspj.cz::294b6a91-341d-4214-a2f9-73ba102f4c39" providerId="AD" clId="Web-{C41F27FD-2CE2-45C4-9C86-675CDA62708E}" dt="2020-11-05T17:53:31.075" v="418" actId="20577"/>
-      <pc:docMkLst>
-        <pc:docMk/>
-      </pc:docMkLst>
-      <pc:sldChg chg="addSp delSp modSp">
-        <pc:chgData name="Martin Doležal" userId="S::doleza92@student.vspj.cz::294b6a91-341d-4214-a2f9-73ba102f4c39" providerId="AD" clId="Web-{C41F27FD-2CE2-45C4-9C86-675CDA62708E}" dt="2020-11-05T17:53:28.856" v="416" actId="20577"/>
-        <pc:sldMkLst>
-          <pc:docMk/>
-          <pc:sldMk cId="4064850815" sldId="258"/>
-        </pc:sldMkLst>
-        <pc:spChg chg="del">
-          <ac:chgData name="Martin Doležal" userId="S::doleza92@student.vspj.cz::294b6a91-341d-4214-a2f9-73ba102f4c39" providerId="AD" clId="Web-{C41F27FD-2CE2-45C4-9C86-675CDA62708E}" dt="2020-11-05T17:15:22.449" v="0"/>
-          <ac:spMkLst>
-            <pc:docMk/>
-            <pc:sldMk cId="4064850815" sldId="258"/>
-            <ac:spMk id="3" creationId="{2553469C-DF1D-4C4F-83B9-240140DFC0FA}"/>
-          </ac:spMkLst>
-        </pc:spChg>
-        <pc:spChg chg="add del">
-          <ac:chgData name="Martin Doležal" userId="S::doleza92@student.vspj.cz::294b6a91-341d-4214-a2f9-73ba102f4c39" providerId="AD" clId="Web-{C41F27FD-2CE2-45C4-9C86-675CDA62708E}" dt="2020-11-05T17:19:30.376" v="8"/>
-          <ac:spMkLst>
-            <pc:docMk/>
-            <pc:sldMk cId="4064850815" sldId="258"/>
-            <ac:spMk id="6" creationId="{FD2C24E7-973B-4F21-BA7E-BD4FDA976E3C}"/>
-          </ac:spMkLst>
-        </pc:spChg>
-        <pc:spChg chg="add mod">
-          <ac:chgData name="Martin Doležal" userId="S::doleza92@student.vspj.cz::294b6a91-341d-4214-a2f9-73ba102f4c39" providerId="AD" clId="Web-{C41F27FD-2CE2-45C4-9C86-675CDA62708E}" dt="2020-11-05T17:51:34.792" v="401" actId="14100"/>
-          <ac:spMkLst>
-            <pc:docMk/>
-            <pc:sldMk cId="4064850815" sldId="258"/>
-            <ac:spMk id="7" creationId="{66089042-3DB0-49D8-93CF-2A8F70D9FFAF}"/>
-          </ac:spMkLst>
-        </pc:spChg>
-        <pc:spChg chg="add mod">
-          <ac:chgData name="Martin Doležal" userId="S::doleza92@student.vspj.cz::294b6a91-341d-4214-a2f9-73ba102f4c39" providerId="AD" clId="Web-{C41F27FD-2CE2-45C4-9C86-675CDA62708E}" dt="2020-11-05T17:51:13.479" v="397" actId="14100"/>
-          <ac:spMkLst>
-            <pc:docMk/>
-            <pc:sldMk cId="4064850815" sldId="258"/>
-            <ac:spMk id="9" creationId="{E5E04CF1-039B-4410-97A1-3CB0309F27B5}"/>
-          </ac:spMkLst>
-        </pc:spChg>
-        <pc:spChg chg="add del">
-          <ac:chgData name="Martin Doležal" userId="S::doleza92@student.vspj.cz::294b6a91-341d-4214-a2f9-73ba102f4c39" providerId="AD" clId="Web-{C41F27FD-2CE2-45C4-9C86-675CDA62708E}" dt="2020-11-05T17:28:46.903" v="125"/>
-          <ac:spMkLst>
-            <pc:docMk/>
-            <pc:sldMk cId="4064850815" sldId="258"/>
-            <ac:spMk id="15" creationId="{3F1AB288-DD19-4238-9523-537B1C6D2EA8}"/>
-          </ac:spMkLst>
-        </pc:spChg>
-        <pc:spChg chg="add mod">
-          <ac:chgData name="Martin Doležal" userId="S::doleza92@student.vspj.cz::294b6a91-341d-4214-a2f9-73ba102f4c39" providerId="AD" clId="Web-{C41F27FD-2CE2-45C4-9C86-675CDA62708E}" dt="2020-11-05T17:53:28.856" v="416" actId="20577"/>
-          <ac:spMkLst>
-            <pc:docMk/>
-            <pc:sldMk cId="4064850815" sldId="258"/>
-            <ac:spMk id="16" creationId="{CBF2DC52-4562-498F-AD59-2705CFEA45A3}"/>
-          </ac:spMkLst>
-        </pc:spChg>
-        <pc:spChg chg="add mod">
-          <ac:chgData name="Martin Doležal" userId="S::doleza92@student.vspj.cz::294b6a91-341d-4214-a2f9-73ba102f4c39" providerId="AD" clId="Web-{C41F27FD-2CE2-45C4-9C86-675CDA62708E}" dt="2020-11-05T17:53:25.966" v="412" actId="20577"/>
-          <ac:spMkLst>
-            <pc:docMk/>
-            <pc:sldMk cId="4064850815" sldId="258"/>
-            <ac:spMk id="17" creationId="{AD808365-616E-47E1-AEC5-D19C58FAEE2C}"/>
-          </ac:spMkLst>
-        </pc:spChg>
-        <pc:spChg chg="add mod">
-          <ac:chgData name="Martin Doležal" userId="S::doleza92@student.vspj.cz::294b6a91-341d-4214-a2f9-73ba102f4c39" providerId="AD" clId="Web-{C41F27FD-2CE2-45C4-9C86-675CDA62708E}" dt="2020-11-05T17:35:00.193" v="223" actId="1076"/>
-          <ac:spMkLst>
-            <pc:docMk/>
-            <pc:sldMk cId="4064850815" sldId="258"/>
-            <ac:spMk id="18" creationId="{23DDC28C-021B-4866-82E3-0E1166E286A3}"/>
-          </ac:spMkLst>
-        </pc:spChg>
-        <pc:spChg chg="add mod">
-          <ac:chgData name="Martin Doležal" userId="S::doleza92@student.vspj.cz::294b6a91-341d-4214-a2f9-73ba102f4c39" providerId="AD" clId="Web-{C41F27FD-2CE2-45C4-9C86-675CDA62708E}" dt="2020-11-05T17:52:22.996" v="404" actId="20577"/>
-          <ac:spMkLst>
-            <pc:docMk/>
-            <pc:sldMk cId="4064850815" sldId="258"/>
-            <ac:spMk id="20" creationId="{9ED59EB9-4877-4730-A785-90465AE15D4F}"/>
-          </ac:spMkLst>
-        </pc:spChg>
-        <pc:spChg chg="add mod">
-          <ac:chgData name="Martin Doležal" userId="S::doleza92@student.vspj.cz::294b6a91-341d-4214-a2f9-73ba102f4c39" providerId="AD" clId="Web-{C41F27FD-2CE2-45C4-9C86-675CDA62708E}" dt="2020-11-05T17:41:21.888" v="328" actId="1076"/>
-          <ac:spMkLst>
-            <pc:docMk/>
-            <pc:sldMk cId="4064850815" sldId="258"/>
-            <ac:spMk id="21" creationId="{3DFC01E0-8456-4F9D-A13C-7E14438FCCC0}"/>
-          </ac:spMkLst>
-        </pc:spChg>
-        <pc:picChg chg="add mod ord">
-          <ac:chgData name="Martin Doležal" userId="S::doleza92@student.vspj.cz::294b6a91-341d-4214-a2f9-73ba102f4c39" providerId="AD" clId="Web-{C41F27FD-2CE2-45C4-9C86-675CDA62708E}" dt="2020-11-05T17:30:47.703" v="182" actId="1076"/>
-          <ac:picMkLst>
-            <pc:docMk/>
-            <pc:sldMk cId="4064850815" sldId="258"/>
-            <ac:picMk id="4" creationId="{7836ABFF-B874-446C-840A-7C63E3CBB8FB}"/>
-          </ac:picMkLst>
-        </pc:picChg>
-        <pc:picChg chg="add del mod">
-          <ac:chgData name="Martin Doležal" userId="S::doleza92@student.vspj.cz::294b6a91-341d-4214-a2f9-73ba102f4c39" providerId="AD" clId="Web-{C41F27FD-2CE2-45C4-9C86-675CDA62708E}" dt="2020-11-05T17:17:27.311" v="6"/>
-          <ac:picMkLst>
-            <pc:docMk/>
-            <pc:sldMk cId="4064850815" sldId="258"/>
-            <ac:picMk id="5" creationId="{1A04EFD4-910D-4F86-8161-F1BB1472D51B}"/>
-          </ac:picMkLst>
-        </pc:picChg>
-        <pc:picChg chg="add mod">
-          <ac:chgData name="Martin Doležal" userId="S::doleza92@student.vspj.cz::294b6a91-341d-4214-a2f9-73ba102f4c39" providerId="AD" clId="Web-{C41F27FD-2CE2-45C4-9C86-675CDA62708E}" dt="2020-11-05T17:32:45.799" v="202" actId="1076"/>
-          <ac:picMkLst>
-            <pc:docMk/>
-            <pc:sldMk cId="4064850815" sldId="258"/>
-            <ac:picMk id="8" creationId="{A4A6C9E7-5407-4440-AFC6-4F2AE8B116D7}"/>
-          </ac:picMkLst>
-        </pc:picChg>
-        <pc:picChg chg="add mod">
-          <ac:chgData name="Martin Doležal" userId="S::doleza92@student.vspj.cz::294b6a91-341d-4214-a2f9-73ba102f4c39" providerId="AD" clId="Web-{C41F27FD-2CE2-45C4-9C86-675CDA62708E}" dt="2020-11-05T17:27:34.792" v="116" actId="14100"/>
-          <ac:picMkLst>
-            <pc:docMk/>
-            <pc:sldMk cId="4064850815" sldId="258"/>
-            <ac:picMk id="11" creationId="{25B6E6AE-B211-423F-9A69-813935CD0733}"/>
-          </ac:picMkLst>
-        </pc:picChg>
-        <pc:picChg chg="add mod">
-          <ac:chgData name="Martin Doležal" userId="S::doleza92@student.vspj.cz::294b6a91-341d-4214-a2f9-73ba102f4c39" providerId="AD" clId="Web-{C41F27FD-2CE2-45C4-9C86-675CDA62708E}" dt="2020-11-05T17:53:04.637" v="408" actId="1076"/>
-          <ac:picMkLst>
-            <pc:docMk/>
-            <pc:sldMk cId="4064850815" sldId="258"/>
-            <ac:picMk id="13" creationId="{805479D7-F782-4922-A89B-705ED56C0A5A}"/>
-          </ac:picMkLst>
-        </pc:picChg>
-        <pc:picChg chg="add mod">
-          <ac:chgData name="Martin Doležal" userId="S::doleza92@student.vspj.cz::294b6a91-341d-4214-a2f9-73ba102f4c39" providerId="AD" clId="Web-{C41F27FD-2CE2-45C4-9C86-675CDA62708E}" dt="2020-11-05T17:35:43.068" v="227" actId="1076"/>
-          <ac:picMkLst>
-            <pc:docMk/>
-            <pc:sldMk cId="4064850815" sldId="258"/>
-            <ac:picMk id="14" creationId="{52DDD4A6-83DA-4EC3-9B49-675D81740623}"/>
-          </ac:picMkLst>
-        </pc:picChg>
-        <pc:picChg chg="add mod">
-          <ac:chgData name="Martin Doležal" userId="S::doleza92@student.vspj.cz::294b6a91-341d-4214-a2f9-73ba102f4c39" providerId="AD" clId="Web-{C41F27FD-2CE2-45C4-9C86-675CDA62708E}" dt="2020-11-05T17:52:41.543" v="407" actId="14100"/>
-          <ac:picMkLst>
-            <pc:docMk/>
-            <pc:sldMk cId="4064850815" sldId="258"/>
-            <ac:picMk id="19" creationId="{50DC1ED1-E129-46B4-B06C-2A7DCD3606BD}"/>
-          </ac:picMkLst>
-        </pc:picChg>
-      </pc:sldChg>
-    </pc:docChg>
-  </pc:docChgLst>
-  <pc:docChgLst>
-    <pc:chgData clId="Web-{22F06AAD-36C1-4528-ADB2-F94FB2319575}"/>
-    <pc:docChg chg="addSld addMainMaster">
-      <pc:chgData name="" userId="" providerId="" clId="Web-{22F06AAD-36C1-4528-ADB2-F94FB2319575}" dt="2020-11-05T16:35:56.731" v="0"/>
-      <pc:docMkLst>
-        <pc:docMk/>
-      </pc:docMkLst>
-      <pc:sldChg chg="add">
-        <pc:chgData name="" userId="" providerId="" clId="Web-{22F06AAD-36C1-4528-ADB2-F94FB2319575}" dt="2020-11-05T16:35:56.731" v="0"/>
-        <pc:sldMkLst>
-          <pc:docMk/>
-          <pc:sldMk cId="3746217773" sldId="261"/>
-        </pc:sldMkLst>
-      </pc:sldChg>
-      <pc:sldMasterChg chg="add addSldLayout">
-        <pc:chgData name="" userId="" providerId="" clId="Web-{22F06AAD-36C1-4528-ADB2-F94FB2319575}" dt="2020-11-05T16:35:56.731" v="0"/>
-        <pc:sldMasterMkLst>
-          <pc:docMk/>
-          <pc:sldMasterMk cId="464252367" sldId="2147483648"/>
-        </pc:sldMasterMkLst>
-        <pc:sldLayoutChg chg="add">
-          <pc:chgData name="" userId="" providerId="" clId="Web-{22F06AAD-36C1-4528-ADB2-F94FB2319575}" dt="2020-11-05T16:35:56.731" v="0"/>
-          <pc:sldLayoutMkLst>
-            <pc:docMk/>
-            <pc:sldMasterMk cId="464252367" sldId="2147483648"/>
-            <pc:sldLayoutMk cId="1771309689" sldId="2147483649"/>
-          </pc:sldLayoutMkLst>
-        </pc:sldLayoutChg>
-        <pc:sldLayoutChg chg="add">
-          <pc:chgData name="" userId="" providerId="" clId="Web-{22F06AAD-36C1-4528-ADB2-F94FB2319575}" dt="2020-11-05T16:35:56.731" v="0"/>
-          <pc:sldLayoutMkLst>
-            <pc:docMk/>
-            <pc:sldMasterMk cId="464252367" sldId="2147483648"/>
-            <pc:sldLayoutMk cId="21655345" sldId="2147483650"/>
-          </pc:sldLayoutMkLst>
-        </pc:sldLayoutChg>
-        <pc:sldLayoutChg chg="add">
-          <pc:chgData name="" userId="" providerId="" clId="Web-{22F06AAD-36C1-4528-ADB2-F94FB2319575}" dt="2020-11-05T16:35:56.731" v="0"/>
-          <pc:sldLayoutMkLst>
-            <pc:docMk/>
-            <pc:sldMasterMk cId="464252367" sldId="2147483648"/>
-            <pc:sldLayoutMk cId="2957285559" sldId="2147483651"/>
-          </pc:sldLayoutMkLst>
-        </pc:sldLayoutChg>
-        <pc:sldLayoutChg chg="add">
-          <pc:chgData name="" userId="" providerId="" clId="Web-{22F06AAD-36C1-4528-ADB2-F94FB2319575}" dt="2020-11-05T16:35:56.731" v="0"/>
-          <pc:sldLayoutMkLst>
-            <pc:docMk/>
-            <pc:sldMasterMk cId="464252367" sldId="2147483648"/>
-            <pc:sldLayoutMk cId="3426106184" sldId="2147483652"/>
-          </pc:sldLayoutMkLst>
-        </pc:sldLayoutChg>
-        <pc:sldLayoutChg chg="add">
-          <pc:chgData name="" userId="" providerId="" clId="Web-{22F06AAD-36C1-4528-ADB2-F94FB2319575}" dt="2020-11-05T16:35:56.731" v="0"/>
-          <pc:sldLayoutMkLst>
-            <pc:docMk/>
-            <pc:sldMasterMk cId="464252367" sldId="2147483648"/>
-            <pc:sldLayoutMk cId="597578085" sldId="2147483653"/>
-          </pc:sldLayoutMkLst>
-        </pc:sldLayoutChg>
-        <pc:sldLayoutChg chg="add">
-          <pc:chgData name="" userId="" providerId="" clId="Web-{22F06AAD-36C1-4528-ADB2-F94FB2319575}" dt="2020-11-05T16:35:56.731" v="0"/>
-          <pc:sldLayoutMkLst>
-            <pc:docMk/>
-            <pc:sldMasterMk cId="464252367" sldId="2147483648"/>
-            <pc:sldLayoutMk cId="3514983867" sldId="2147483654"/>
-          </pc:sldLayoutMkLst>
-        </pc:sldLayoutChg>
-        <pc:sldLayoutChg chg="add">
-          <pc:chgData name="" userId="" providerId="" clId="Web-{22F06AAD-36C1-4528-ADB2-F94FB2319575}" dt="2020-11-05T16:35:56.731" v="0"/>
-          <pc:sldLayoutMkLst>
-            <pc:docMk/>
-            <pc:sldMasterMk cId="464252367" sldId="2147483648"/>
-            <pc:sldLayoutMk cId="2973794414" sldId="2147483655"/>
-          </pc:sldLayoutMkLst>
-        </pc:sldLayoutChg>
-        <pc:sldLayoutChg chg="add">
-          <pc:chgData name="" userId="" providerId="" clId="Web-{22F06AAD-36C1-4528-ADB2-F94FB2319575}" dt="2020-11-05T16:35:56.731" v="0"/>
-          <pc:sldLayoutMkLst>
-            <pc:docMk/>
-            <pc:sldMasterMk cId="464252367" sldId="2147483648"/>
-            <pc:sldLayoutMk cId="3504307544" sldId="2147483656"/>
-          </pc:sldLayoutMkLst>
-        </pc:sldLayoutChg>
-        <pc:sldLayoutChg chg="add">
-          <pc:chgData name="" userId="" providerId="" clId="Web-{22F06AAD-36C1-4528-ADB2-F94FB2319575}" dt="2020-11-05T16:35:56.731" v="0"/>
-          <pc:sldLayoutMkLst>
-            <pc:docMk/>
-            <pc:sldMasterMk cId="464252367" sldId="2147483648"/>
-            <pc:sldLayoutMk cId="4088594436" sldId="2147483657"/>
-          </pc:sldLayoutMkLst>
-        </pc:sldLayoutChg>
-        <pc:sldLayoutChg chg="add">
-          <pc:chgData name="" userId="" providerId="" clId="Web-{22F06AAD-36C1-4528-ADB2-F94FB2319575}" dt="2020-11-05T16:35:56.731" v="0"/>
-          <pc:sldLayoutMkLst>
-            <pc:docMk/>
-            <pc:sldMasterMk cId="464252367" sldId="2147483648"/>
-            <pc:sldLayoutMk cId="707188527" sldId="2147483658"/>
-          </pc:sldLayoutMkLst>
-        </pc:sldLayoutChg>
-        <pc:sldLayoutChg chg="add">
-          <pc:chgData name="" userId="" providerId="" clId="Web-{22F06AAD-36C1-4528-ADB2-F94FB2319575}" dt="2020-11-05T16:35:56.731" v="0"/>
-          <pc:sldLayoutMkLst>
-            <pc:docMk/>
-            <pc:sldMasterMk cId="464252367" sldId="2147483648"/>
-            <pc:sldLayoutMk cId="1955787437" sldId="2147483659"/>
-          </pc:sldLayoutMkLst>
-        </pc:sldLayoutChg>
-      </pc:sldMasterChg>
-    </pc:docChg>
-  </pc:docChgLst>
-  <pc:docChgLst>
-    <pc:chgData name="Martin Linka" userId="S::linka@student.vspj.cz::6ac17739-01f6-41b6-b551-05cfd3691ae0" providerId="AD" clId="Web-{22F06AAD-36C1-4528-ADB2-F94FB2319575}"/>
-    <pc:docChg chg="delSld modSld addMainMaster delMainMaster">
-      <pc:chgData name="Martin Linka" userId="S::linka@student.vspj.cz::6ac17739-01f6-41b6-b551-05cfd3691ae0" providerId="AD" clId="Web-{22F06AAD-36C1-4528-ADB2-F94FB2319575}" dt="2020-11-05T17:03:21.446" v="1301" actId="1076"/>
-      <pc:docMkLst>
-        <pc:docMk/>
-      </pc:docMkLst>
-      <pc:sldChg chg="modSp mod modClrScheme chgLayout">
-        <pc:chgData name="Martin Linka" userId="S::linka@student.vspj.cz::6ac17739-01f6-41b6-b551-05cfd3691ae0" providerId="AD" clId="Web-{22F06AAD-36C1-4528-ADB2-F94FB2319575}" dt="2020-11-05T15:54:16.050" v="843"/>
-        <pc:sldMkLst>
-          <pc:docMk/>
-          <pc:sldMk cId="3799523001" sldId="256"/>
-        </pc:sldMkLst>
-        <pc:spChg chg="mod ord">
-          <ac:chgData name="Martin Linka" userId="S::linka@student.vspj.cz::6ac17739-01f6-41b6-b551-05cfd3691ae0" providerId="AD" clId="Web-{22F06AAD-36C1-4528-ADB2-F94FB2319575}" dt="2020-11-05T15:54:16.050" v="843"/>
-          <ac:spMkLst>
-            <pc:docMk/>
-            <pc:sldMk cId="3799523001" sldId="256"/>
-            <ac:spMk id="2" creationId="{00000000-0000-0000-0000-000000000000}"/>
-          </ac:spMkLst>
-        </pc:spChg>
-        <pc:spChg chg="mod ord">
-          <ac:chgData name="Martin Linka" userId="S::linka@student.vspj.cz::6ac17739-01f6-41b6-b551-05cfd3691ae0" providerId="AD" clId="Web-{22F06AAD-36C1-4528-ADB2-F94FB2319575}" dt="2020-11-05T15:54:16.050" v="843"/>
-          <ac:spMkLst>
-            <pc:docMk/>
-            <pc:sldMk cId="3799523001" sldId="256"/>
-            <ac:spMk id="3" creationId="{00000000-0000-0000-0000-000000000000}"/>
-          </ac:spMkLst>
-        </pc:spChg>
-      </pc:sldChg>
-      <pc:sldChg chg="modSp mod modClrScheme chgLayout">
-        <pc:chgData name="Martin Linka" userId="S::linka@student.vspj.cz::6ac17739-01f6-41b6-b551-05cfd3691ae0" providerId="AD" clId="Web-{22F06AAD-36C1-4528-ADB2-F94FB2319575}" dt="2020-11-05T15:54:16.050" v="843"/>
-        <pc:sldMkLst>
-          <pc:docMk/>
-          <pc:sldMk cId="2751309796" sldId="257"/>
-        </pc:sldMkLst>
-        <pc:spChg chg="mod ord">
-          <ac:chgData name="Martin Linka" userId="S::linka@student.vspj.cz::6ac17739-01f6-41b6-b551-05cfd3691ae0" providerId="AD" clId="Web-{22F06AAD-36C1-4528-ADB2-F94FB2319575}" dt="2020-11-05T15:54:16.050" v="843"/>
-          <ac:spMkLst>
-            <pc:docMk/>
-            <pc:sldMk cId="2751309796" sldId="257"/>
-            <ac:spMk id="2" creationId="{42D9A6D5-8C69-4578-BB48-2877A7E0A6FD}"/>
-          </ac:spMkLst>
-        </pc:spChg>
-        <pc:spChg chg="mod ord">
-          <ac:chgData name="Martin Linka" userId="S::linka@student.vspj.cz::6ac17739-01f6-41b6-b551-05cfd3691ae0" providerId="AD" clId="Web-{22F06AAD-36C1-4528-ADB2-F94FB2319575}" dt="2020-11-05T15:54:16.050" v="843"/>
-          <ac:spMkLst>
-            <pc:docMk/>
-            <pc:sldMk cId="2751309796" sldId="257"/>
-            <ac:spMk id="3" creationId="{2553469C-DF1D-4C4F-83B9-240140DFC0FA}"/>
-          </ac:spMkLst>
-        </pc:spChg>
-      </pc:sldChg>
-      <pc:sldChg chg="modSp mod modClrScheme chgLayout">
-        <pc:chgData name="Martin Linka" userId="S::linka@student.vspj.cz::6ac17739-01f6-41b6-b551-05cfd3691ae0" providerId="AD" clId="Web-{22F06AAD-36C1-4528-ADB2-F94FB2319575}" dt="2020-11-05T15:54:16.050" v="843"/>
-        <pc:sldMkLst>
-          <pc:docMk/>
-          <pc:sldMk cId="4064850815" sldId="258"/>
-        </pc:sldMkLst>
-        <pc:spChg chg="mod ord">
-          <ac:chgData name="Martin Linka" userId="S::linka@student.vspj.cz::6ac17739-01f6-41b6-b551-05cfd3691ae0" providerId="AD" clId="Web-{22F06AAD-36C1-4528-ADB2-F94FB2319575}" dt="2020-11-05T15:54:16.050" v="843"/>
-          <ac:spMkLst>
-            <pc:docMk/>
-            <pc:sldMk cId="4064850815" sldId="258"/>
-            <ac:spMk id="2" creationId="{42D9A6D5-8C69-4578-BB48-2877A7E0A6FD}"/>
-          </ac:spMkLst>
-        </pc:spChg>
-        <pc:spChg chg="mod ord">
-          <ac:chgData name="Martin Linka" userId="S::linka@student.vspj.cz::6ac17739-01f6-41b6-b551-05cfd3691ae0" providerId="AD" clId="Web-{22F06AAD-36C1-4528-ADB2-F94FB2319575}" dt="2020-11-05T15:54:16.050" v="843"/>
-          <ac:spMkLst>
-            <pc:docMk/>
-            <pc:sldMk cId="4064850815" sldId="258"/>
-            <ac:spMk id="3" creationId="{2553469C-DF1D-4C4F-83B9-240140DFC0FA}"/>
-          </ac:spMkLst>
-        </pc:spChg>
-      </pc:sldChg>
-      <pc:sldChg chg="modSp mod modClrScheme chgLayout">
-        <pc:chgData name="Martin Linka" userId="S::linka@student.vspj.cz::6ac17739-01f6-41b6-b551-05cfd3691ae0" providerId="AD" clId="Web-{22F06AAD-36C1-4528-ADB2-F94FB2319575}" dt="2020-11-05T15:57:05.180" v="1086" actId="20577"/>
-        <pc:sldMkLst>
-          <pc:docMk/>
-          <pc:sldMk cId="2473264053" sldId="259"/>
-        </pc:sldMkLst>
-        <pc:spChg chg="mod ord">
-          <ac:chgData name="Martin Linka" userId="S::linka@student.vspj.cz::6ac17739-01f6-41b6-b551-05cfd3691ae0" providerId="AD" clId="Web-{22F06AAD-36C1-4528-ADB2-F94FB2319575}" dt="2020-11-05T15:54:16.050" v="843"/>
-          <ac:spMkLst>
-            <pc:docMk/>
-            <pc:sldMk cId="2473264053" sldId="259"/>
-            <ac:spMk id="2" creationId="{42D9A6D5-8C69-4578-BB48-2877A7E0A6FD}"/>
-          </ac:spMkLst>
-        </pc:spChg>
-        <pc:spChg chg="mod ord">
-          <ac:chgData name="Martin Linka" userId="S::linka@student.vspj.cz::6ac17739-01f6-41b6-b551-05cfd3691ae0" providerId="AD" clId="Web-{22F06AAD-36C1-4528-ADB2-F94FB2319575}" dt="2020-11-05T15:57:05.180" v="1086" actId="20577"/>
-          <ac:spMkLst>
-            <pc:docMk/>
-            <pc:sldMk cId="2473264053" sldId="259"/>
-            <ac:spMk id="3" creationId="{2553469C-DF1D-4C4F-83B9-240140DFC0FA}"/>
-          </ac:spMkLst>
-        </pc:spChg>
-      </pc:sldChg>
-      <pc:sldChg chg="addSp delSp modSp mod setBg modClrScheme chgLayout">
-        <pc:chgData name="Martin Linka" userId="S::linka@student.vspj.cz::6ac17739-01f6-41b6-b551-05cfd3691ae0" providerId="AD" clId="Web-{22F06AAD-36C1-4528-ADB2-F94FB2319575}" dt="2020-11-05T17:03:21.446" v="1301" actId="1076"/>
-        <pc:sldMkLst>
-          <pc:docMk/>
-          <pc:sldMk cId="693303209" sldId="260"/>
-        </pc:sldMkLst>
-        <pc:spChg chg="mod ord">
-          <ac:chgData name="Martin Linka" userId="S::linka@student.vspj.cz::6ac17739-01f6-41b6-b551-05cfd3691ae0" providerId="AD" clId="Web-{22F06AAD-36C1-4528-ADB2-F94FB2319575}" dt="2020-11-05T17:02:19.319" v="1244"/>
-          <ac:spMkLst>
-            <pc:docMk/>
-            <pc:sldMk cId="693303209" sldId="260"/>
-            <ac:spMk id="2" creationId="{42D9A6D5-8C69-4578-BB48-2877A7E0A6FD}"/>
-          </ac:spMkLst>
-        </pc:spChg>
-        <pc:spChg chg="del mod ord">
-          <ac:chgData name="Martin Linka" userId="S::linka@student.vspj.cz::6ac17739-01f6-41b6-b551-05cfd3691ae0" providerId="AD" clId="Web-{22F06AAD-36C1-4528-ADB2-F94FB2319575}" dt="2020-11-05T17:00:40.489" v="1110"/>
-          <ac:spMkLst>
-            <pc:docMk/>
-            <pc:sldMk cId="693303209" sldId="260"/>
-            <ac:spMk id="3" creationId="{2553469C-DF1D-4C4F-83B9-240140DFC0FA}"/>
-          </ac:spMkLst>
-        </pc:spChg>
-        <pc:spChg chg="add mod ord">
-          <ac:chgData name="Martin Linka" userId="S::linka@student.vspj.cz::6ac17739-01f6-41b6-b551-05cfd3691ae0" providerId="AD" clId="Web-{22F06AAD-36C1-4528-ADB2-F94FB2319575}" dt="2020-11-05T17:03:15.961" v="1297" actId="20577"/>
-          <ac:spMkLst>
-            <pc:docMk/>
-            <pc:sldMk cId="693303209" sldId="260"/>
-            <ac:spMk id="5" creationId="{F0005D57-43A1-4BA3-98F1-286F00E1A708}"/>
-          </ac:spMkLst>
-        </pc:spChg>
-        <pc:spChg chg="add del">
-          <ac:chgData name="Martin Linka" userId="S::linka@student.vspj.cz::6ac17739-01f6-41b6-b551-05cfd3691ae0" providerId="AD" clId="Web-{22F06AAD-36C1-4528-ADB2-F94FB2319575}" dt="2020-11-05T17:02:19.319" v="1244"/>
-          <ac:spMkLst>
-            <pc:docMk/>
-            <pc:sldMk cId="693303209" sldId="260"/>
-            <ac:spMk id="10" creationId="{4E4490D0-3672-446A-AC12-B4830333BDDD}"/>
-          </ac:spMkLst>
-        </pc:spChg>
-        <pc:spChg chg="add del">
-          <ac:chgData name="Martin Linka" userId="S::linka@student.vspj.cz::6ac17739-01f6-41b6-b551-05cfd3691ae0" providerId="AD" clId="Web-{22F06AAD-36C1-4528-ADB2-F94FB2319575}" dt="2020-11-05T17:02:19.319" v="1244"/>
-          <ac:spMkLst>
-            <pc:docMk/>
-            <pc:sldMk cId="693303209" sldId="260"/>
-            <ac:spMk id="12" creationId="{39CB82C2-DF65-4EC1-8280-F201D50F570B}"/>
-          </ac:spMkLst>
-        </pc:spChg>
-        <pc:spChg chg="add del">
-          <ac:chgData name="Martin Linka" userId="S::linka@student.vspj.cz::6ac17739-01f6-41b6-b551-05cfd3691ae0" providerId="AD" clId="Web-{22F06AAD-36C1-4528-ADB2-F94FB2319575}" dt="2020-11-05T17:02:19.319" v="1244"/>
-          <ac:spMkLst>
-            <pc:docMk/>
-            <pc:sldMk cId="693303209" sldId="260"/>
-            <ac:spMk id="16" creationId="{FA4CD5CB-D209-4D70-8CA4-629731C59219}"/>
-          </ac:spMkLst>
-        </pc:spChg>
-        <pc:spChg chg="add del">
-          <ac:chgData name="Martin Linka" userId="S::linka@student.vspj.cz::6ac17739-01f6-41b6-b551-05cfd3691ae0" providerId="AD" clId="Web-{22F06AAD-36C1-4528-ADB2-F94FB2319575}" dt="2020-11-05T17:02:19.319" v="1244"/>
-          <ac:spMkLst>
-            <pc:docMk/>
-            <pc:sldMk cId="693303209" sldId="260"/>
-            <ac:spMk id="20" creationId="{B4C27B90-DF2B-4D00-BA07-18ED774CD2F1}"/>
-          </ac:spMkLst>
-        </pc:spChg>
-        <pc:spChg chg="add del">
-          <ac:chgData name="Martin Linka" userId="S::linka@student.vspj.cz::6ac17739-01f6-41b6-b551-05cfd3691ae0" providerId="AD" clId="Web-{22F06AAD-36C1-4528-ADB2-F94FB2319575}" dt="2020-11-05T17:02:19.319" v="1244"/>
-          <ac:spMkLst>
-            <pc:docMk/>
-            <pc:sldMk cId="693303209" sldId="260"/>
-            <ac:spMk id="22" creationId="{593ACC25-C262-417A-8AA9-0641C772BDB6}"/>
-          </ac:spMkLst>
-        </pc:spChg>
-        <pc:picChg chg="add mod ord">
-          <ac:chgData name="Martin Linka" userId="S::linka@student.vspj.cz::6ac17739-01f6-41b6-b551-05cfd3691ae0" providerId="AD" clId="Web-{22F06AAD-36C1-4528-ADB2-F94FB2319575}" dt="2020-11-05T17:03:21.446" v="1301" actId="1076"/>
-          <ac:picMkLst>
-            <pc:docMk/>
-            <pc:sldMk cId="693303209" sldId="260"/>
-            <ac:picMk id="4" creationId="{A8C580A4-5EC2-4DC6-8ECA-AD9A41D1B30A}"/>
-          </ac:picMkLst>
-        </pc:picChg>
-        <pc:cxnChg chg="add del">
-          <ac:chgData name="Martin Linka" userId="S::linka@student.vspj.cz::6ac17739-01f6-41b6-b551-05cfd3691ae0" providerId="AD" clId="Web-{22F06AAD-36C1-4528-ADB2-F94FB2319575}" dt="2020-11-05T17:02:19.319" v="1244"/>
-          <ac:cxnSpMkLst>
-            <pc:docMk/>
-            <pc:sldMk cId="693303209" sldId="260"/>
-            <ac:cxnSpMk id="14" creationId="{7E1D4427-852B-4B37-8E76-0E9F1810BA2A}"/>
-          </ac:cxnSpMkLst>
-        </pc:cxnChg>
-        <pc:cxnChg chg="add del">
-          <ac:chgData name="Martin Linka" userId="S::linka@student.vspj.cz::6ac17739-01f6-41b6-b551-05cfd3691ae0" providerId="AD" clId="Web-{22F06AAD-36C1-4528-ADB2-F94FB2319575}" dt="2020-11-05T17:02:19.319" v="1244"/>
-          <ac:cxnSpMkLst>
-            <pc:docMk/>
-            <pc:sldMk cId="693303209" sldId="260"/>
-            <ac:cxnSpMk id="18" creationId="{5C6A2BAE-B461-4B55-8E1F-0722ABDD1393}"/>
-          </ac:cxnSpMkLst>
-        </pc:cxnChg>
-      </pc:sldChg>
-      <pc:sldChg chg="del">
-        <pc:chgData name="Martin Linka" userId="S::linka@student.vspj.cz::6ac17739-01f6-41b6-b551-05cfd3691ae0" providerId="AD" clId="Web-{22F06AAD-36C1-4528-ADB2-F94FB2319575}" dt="2020-11-05T16:36:01.215" v="1088"/>
-        <pc:sldMkLst>
-          <pc:docMk/>
-          <pc:sldMk cId="3746217773" sldId="261"/>
-        </pc:sldMkLst>
-      </pc:sldChg>
-      <pc:sldMasterChg chg="del delSldLayout">
-        <pc:chgData name="Martin Linka" userId="S::linka@student.vspj.cz::6ac17739-01f6-41b6-b551-05cfd3691ae0" providerId="AD" clId="Web-{22F06AAD-36C1-4528-ADB2-F94FB2319575}" dt="2020-11-05T15:54:16.050" v="843"/>
-        <pc:sldMasterMkLst>
-          <pc:docMk/>
-          <pc:sldMasterMk cId="464252367" sldId="2147483648"/>
-        </pc:sldMasterMkLst>
-        <pc:sldLayoutChg chg="del">
-          <pc:chgData name="Martin Linka" userId="S::linka@student.vspj.cz::6ac17739-01f6-41b6-b551-05cfd3691ae0" providerId="AD" clId="Web-{22F06AAD-36C1-4528-ADB2-F94FB2319575}" dt="2020-11-05T15:54:16.050" v="843"/>
-          <pc:sldLayoutMkLst>
-            <pc:docMk/>
-            <pc:sldMasterMk cId="464252367" sldId="2147483648"/>
-            <pc:sldLayoutMk cId="1771309689" sldId="2147483649"/>
-          </pc:sldLayoutMkLst>
-        </pc:sldLayoutChg>
-        <pc:sldLayoutChg chg="del">
-          <pc:chgData name="Martin Linka" userId="S::linka@student.vspj.cz::6ac17739-01f6-41b6-b551-05cfd3691ae0" providerId="AD" clId="Web-{22F06AAD-36C1-4528-ADB2-F94FB2319575}" dt="2020-11-05T15:54:16.050" v="843"/>
-          <pc:sldLayoutMkLst>
-            <pc:docMk/>
-            <pc:sldMasterMk cId="464252367" sldId="2147483648"/>
-            <pc:sldLayoutMk cId="21655345" sldId="2147483650"/>
-          </pc:sldLayoutMkLst>
-        </pc:sldLayoutChg>
-        <pc:sldLayoutChg chg="del">
-          <pc:chgData name="Martin Linka" userId="S::linka@student.vspj.cz::6ac17739-01f6-41b6-b551-05cfd3691ae0" providerId="AD" clId="Web-{22F06AAD-36C1-4528-ADB2-F94FB2319575}" dt="2020-11-05T15:54:16.050" v="843"/>
-          <pc:sldLayoutMkLst>
-            <pc:docMk/>
-            <pc:sldMasterMk cId="464252367" sldId="2147483648"/>
-            <pc:sldLayoutMk cId="2957285559" sldId="2147483651"/>
-          </pc:sldLayoutMkLst>
-        </pc:sldLayoutChg>
-        <pc:sldLayoutChg chg="del">
-          <pc:chgData name="Martin Linka" userId="S::linka@student.vspj.cz::6ac17739-01f6-41b6-b551-05cfd3691ae0" providerId="AD" clId="Web-{22F06AAD-36C1-4528-ADB2-F94FB2319575}" dt="2020-11-05T15:54:16.050" v="843"/>
-          <pc:sldLayoutMkLst>
-            <pc:docMk/>
-            <pc:sldMasterMk cId="464252367" sldId="2147483648"/>
-            <pc:sldLayoutMk cId="3426106184" sldId="2147483652"/>
-          </pc:sldLayoutMkLst>
-        </pc:sldLayoutChg>
-        <pc:sldLayoutChg chg="del">
-          <pc:chgData name="Martin Linka" userId="S::linka@student.vspj.cz::6ac17739-01f6-41b6-b551-05cfd3691ae0" providerId="AD" clId="Web-{22F06AAD-36C1-4528-ADB2-F94FB2319575}" dt="2020-11-05T15:54:16.050" v="843"/>
-          <pc:sldLayoutMkLst>
-            <pc:docMk/>
-            <pc:sldMasterMk cId="464252367" sldId="2147483648"/>
-            <pc:sldLayoutMk cId="597578085" sldId="2147483653"/>
-          </pc:sldLayoutMkLst>
-        </pc:sldLayoutChg>
-        <pc:sldLayoutChg chg="del">
-          <pc:chgData name="Martin Linka" userId="S::linka@student.vspj.cz::6ac17739-01f6-41b6-b551-05cfd3691ae0" providerId="AD" clId="Web-{22F06AAD-36C1-4528-ADB2-F94FB2319575}" dt="2020-11-05T15:54:16.050" v="843"/>
-          <pc:sldLayoutMkLst>
-            <pc:docMk/>
-            <pc:sldMasterMk cId="464252367" sldId="2147483648"/>
-            <pc:sldLayoutMk cId="3514983867" sldId="2147483654"/>
-          </pc:sldLayoutMkLst>
-        </pc:sldLayoutChg>
-        <pc:sldLayoutChg chg="del">
-          <pc:chgData name="Martin Linka" userId="S::linka@student.vspj.cz::6ac17739-01f6-41b6-b551-05cfd3691ae0" providerId="AD" clId="Web-{22F06AAD-36C1-4528-ADB2-F94FB2319575}" dt="2020-11-05T15:54:16.050" v="843"/>
-          <pc:sldLayoutMkLst>
-            <pc:docMk/>
-            <pc:sldMasterMk cId="464252367" sldId="2147483648"/>
-            <pc:sldLayoutMk cId="2973794414" sldId="2147483655"/>
-          </pc:sldLayoutMkLst>
-        </pc:sldLayoutChg>
-        <pc:sldLayoutChg chg="del">
-          <pc:chgData name="Martin Linka" userId="S::linka@student.vspj.cz::6ac17739-01f6-41b6-b551-05cfd3691ae0" providerId="AD" clId="Web-{22F06AAD-36C1-4528-ADB2-F94FB2319575}" dt="2020-11-05T15:54:16.050" v="843"/>
-          <pc:sldLayoutMkLst>
-            <pc:docMk/>
-            <pc:sldMasterMk cId="464252367" sldId="2147483648"/>
-            <pc:sldLayoutMk cId="3504307544" sldId="2147483656"/>
-          </pc:sldLayoutMkLst>
-        </pc:sldLayoutChg>
-        <pc:sldLayoutChg chg="del">
-          <pc:chgData name="Martin Linka" userId="S::linka@student.vspj.cz::6ac17739-01f6-41b6-b551-05cfd3691ae0" providerId="AD" clId="Web-{22F06AAD-36C1-4528-ADB2-F94FB2319575}" dt="2020-11-05T15:54:16.050" v="843"/>
-          <pc:sldLayoutMkLst>
-            <pc:docMk/>
-            <pc:sldMasterMk cId="464252367" sldId="2147483648"/>
-            <pc:sldLayoutMk cId="4088594436" sldId="2147483657"/>
-          </pc:sldLayoutMkLst>
-        </pc:sldLayoutChg>
-        <pc:sldLayoutChg chg="del">
-          <pc:chgData name="Martin Linka" userId="S::linka@student.vspj.cz::6ac17739-01f6-41b6-b551-05cfd3691ae0" providerId="AD" clId="Web-{22F06AAD-36C1-4528-ADB2-F94FB2319575}" dt="2020-11-05T15:54:16.050" v="843"/>
-          <pc:sldLayoutMkLst>
-            <pc:docMk/>
-            <pc:sldMasterMk cId="464252367" sldId="2147483648"/>
-            <pc:sldLayoutMk cId="707188527" sldId="2147483658"/>
-          </pc:sldLayoutMkLst>
-        </pc:sldLayoutChg>
-        <pc:sldLayoutChg chg="del">
-          <pc:chgData name="Martin Linka" userId="S::linka@student.vspj.cz::6ac17739-01f6-41b6-b551-05cfd3691ae0" providerId="AD" clId="Web-{22F06AAD-36C1-4528-ADB2-F94FB2319575}" dt="2020-11-05T15:54:16.050" v="843"/>
-          <pc:sldLayoutMkLst>
-            <pc:docMk/>
-            <pc:sldMasterMk cId="464252367" sldId="2147483648"/>
-            <pc:sldLayoutMk cId="1955787437" sldId="2147483659"/>
-          </pc:sldLayoutMkLst>
-        </pc:sldLayoutChg>
-      </pc:sldMasterChg>
-      <pc:sldMasterChg chg="add addSldLayout modSldLayout">
-        <pc:chgData name="Martin Linka" userId="S::linka@student.vspj.cz::6ac17739-01f6-41b6-b551-05cfd3691ae0" providerId="AD" clId="Web-{22F06AAD-36C1-4528-ADB2-F94FB2319575}" dt="2020-11-05T15:54:16.050" v="843"/>
-        <pc:sldMasterMkLst>
-          <pc:docMk/>
-          <pc:sldMasterMk cId="4238153889" sldId="2147483660"/>
-        </pc:sldMasterMkLst>
-        <pc:sldLayoutChg chg="add mod replId">
-          <pc:chgData name="Martin Linka" userId="S::linka@student.vspj.cz::6ac17739-01f6-41b6-b551-05cfd3691ae0" providerId="AD" clId="Web-{22F06AAD-36C1-4528-ADB2-F94FB2319575}" dt="2020-11-05T15:54:16.050" v="843"/>
-          <pc:sldLayoutMkLst>
-            <pc:docMk/>
-            <pc:sldMasterMk cId="4238153889" sldId="2147483660"/>
-            <pc:sldLayoutMk cId="1637382178" sldId="2147483661"/>
-          </pc:sldLayoutMkLst>
-        </pc:sldLayoutChg>
-        <pc:sldLayoutChg chg="add mod replId">
-          <pc:chgData name="Martin Linka" userId="S::linka@student.vspj.cz::6ac17739-01f6-41b6-b551-05cfd3691ae0" providerId="AD" clId="Web-{22F06AAD-36C1-4528-ADB2-F94FB2319575}" dt="2020-11-05T15:54:16.050" v="843"/>
-          <pc:sldLayoutMkLst>
-            <pc:docMk/>
-            <pc:sldMasterMk cId="4238153889" sldId="2147483660"/>
-            <pc:sldLayoutMk cId="1542814417" sldId="2147483662"/>
-          </pc:sldLayoutMkLst>
-        </pc:sldLayoutChg>
-        <pc:sldLayoutChg chg="add mod replId">
-          <pc:chgData name="Martin Linka" userId="S::linka@student.vspj.cz::6ac17739-01f6-41b6-b551-05cfd3691ae0" providerId="AD" clId="Web-{22F06AAD-36C1-4528-ADB2-F94FB2319575}" dt="2020-11-05T15:54:16.050" v="843"/>
-          <pc:sldLayoutMkLst>
-            <pc:docMk/>
-            <pc:sldMasterMk cId="4238153889" sldId="2147483660"/>
-            <pc:sldLayoutMk cId="3636456307" sldId="2147483663"/>
-          </pc:sldLayoutMkLst>
-        </pc:sldLayoutChg>
-        <pc:sldLayoutChg chg="add mod replId">
-          <pc:chgData name="Martin Linka" userId="S::linka@student.vspj.cz::6ac17739-01f6-41b6-b551-05cfd3691ae0" providerId="AD" clId="Web-{22F06AAD-36C1-4528-ADB2-F94FB2319575}" dt="2020-11-05T15:54:16.050" v="843"/>
-          <pc:sldLayoutMkLst>
-            <pc:docMk/>
-            <pc:sldMasterMk cId="4238153889" sldId="2147483660"/>
-            <pc:sldLayoutMk cId="1091386767" sldId="2147483664"/>
-          </pc:sldLayoutMkLst>
-        </pc:sldLayoutChg>
-        <pc:sldLayoutChg chg="add mod replId">
-          <pc:chgData name="Martin Linka" userId="S::linka@student.vspj.cz::6ac17739-01f6-41b6-b551-05cfd3691ae0" providerId="AD" clId="Web-{22F06AAD-36C1-4528-ADB2-F94FB2319575}" dt="2020-11-05T15:54:16.050" v="843"/>
-          <pc:sldLayoutMkLst>
-            <pc:docMk/>
-            <pc:sldMasterMk cId="4238153889" sldId="2147483660"/>
-            <pc:sldLayoutMk cId="984609127" sldId="2147483665"/>
-          </pc:sldLayoutMkLst>
-        </pc:sldLayoutChg>
-        <pc:sldLayoutChg chg="add mod replId">
-          <pc:chgData name="Martin Linka" userId="S::linka@student.vspj.cz::6ac17739-01f6-41b6-b551-05cfd3691ae0" providerId="AD" clId="Web-{22F06AAD-36C1-4528-ADB2-F94FB2319575}" dt="2020-11-05T15:54:16.050" v="843"/>
-          <pc:sldLayoutMkLst>
-            <pc:docMk/>
-            <pc:sldMasterMk cId="4238153889" sldId="2147483660"/>
-            <pc:sldLayoutMk cId="2471892190" sldId="2147483666"/>
-          </pc:sldLayoutMkLst>
-        </pc:sldLayoutChg>
-        <pc:sldLayoutChg chg="add mod replId">
-          <pc:chgData name="Martin Linka" userId="S::linka@student.vspj.cz::6ac17739-01f6-41b6-b551-05cfd3691ae0" providerId="AD" clId="Web-{22F06AAD-36C1-4528-ADB2-F94FB2319575}" dt="2020-11-05T15:54:16.050" v="843"/>
-          <pc:sldLayoutMkLst>
-            <pc:docMk/>
-            <pc:sldMasterMk cId="4238153889" sldId="2147483660"/>
-            <pc:sldLayoutMk cId="2389587950" sldId="2147483667"/>
-          </pc:sldLayoutMkLst>
-        </pc:sldLayoutChg>
-        <pc:sldLayoutChg chg="add mod replId">
-          <pc:chgData name="Martin Linka" userId="S::linka@student.vspj.cz::6ac17739-01f6-41b6-b551-05cfd3691ae0" providerId="AD" clId="Web-{22F06AAD-36C1-4528-ADB2-F94FB2319575}" dt="2020-11-05T15:54:16.050" v="843"/>
-          <pc:sldLayoutMkLst>
-            <pc:docMk/>
-            <pc:sldMasterMk cId="4238153889" sldId="2147483660"/>
-            <pc:sldLayoutMk cId="1400707241" sldId="2147483668"/>
-          </pc:sldLayoutMkLst>
-        </pc:sldLayoutChg>
-        <pc:sldLayoutChg chg="add mod replId">
-          <pc:chgData name="Martin Linka" userId="S::linka@student.vspj.cz::6ac17739-01f6-41b6-b551-05cfd3691ae0" providerId="AD" clId="Web-{22F06AAD-36C1-4528-ADB2-F94FB2319575}" dt="2020-11-05T15:54:16.050" v="843"/>
-          <pc:sldLayoutMkLst>
-            <pc:docMk/>
-            <pc:sldMasterMk cId="4238153889" sldId="2147483660"/>
-            <pc:sldLayoutMk cId="3485386540" sldId="2147483669"/>
-          </pc:sldLayoutMkLst>
-        </pc:sldLayoutChg>
-        <pc:sldLayoutChg chg="add mod replId">
-          <pc:chgData name="Martin Linka" userId="S::linka@student.vspj.cz::6ac17739-01f6-41b6-b551-05cfd3691ae0" providerId="AD" clId="Web-{22F06AAD-36C1-4528-ADB2-F94FB2319575}" dt="2020-11-05T15:54:16.050" v="843"/>
-          <pc:sldLayoutMkLst>
-            <pc:docMk/>
-            <pc:sldMasterMk cId="4238153889" sldId="2147483660"/>
-            <pc:sldLayoutMk cId="3519706549" sldId="2147483670"/>
-          </pc:sldLayoutMkLst>
-        </pc:sldLayoutChg>
-        <pc:sldLayoutChg chg="add mod replId">
-          <pc:chgData name="Martin Linka" userId="S::linka@student.vspj.cz::6ac17739-01f6-41b6-b551-05cfd3691ae0" providerId="AD" clId="Web-{22F06AAD-36C1-4528-ADB2-F94FB2319575}" dt="2020-11-05T15:54:16.050" v="843"/>
-          <pc:sldLayoutMkLst>
-            <pc:docMk/>
-            <pc:sldMasterMk cId="4238153889" sldId="2147483660"/>
-            <pc:sldLayoutMk cId="3655490536" sldId="2147483671"/>
-          </pc:sldLayoutMkLst>
-        </pc:sldLayoutChg>
-      </pc:sldMasterChg>
-    </pc:docChg>
-  </pc:docChgLst>
-  <pc:docChgLst>
-    <pc:chgData name="Martin Linka" userId="S::linka@student.vspj.cz::6ac17739-01f6-41b6-b551-05cfd3691ae0" providerId="AD" clId="Web-{6F7FDFBA-89CE-4A86-BCCE-E48FC4237A03}"/>
-    <pc:docChg chg="modSld">
-      <pc:chgData name="Martin Linka" userId="S::linka@student.vspj.cz::6ac17739-01f6-41b6-b551-05cfd3691ae0" providerId="AD" clId="Web-{6F7FDFBA-89CE-4A86-BCCE-E48FC4237A03}" dt="2020-11-05T17:13:13.711" v="58" actId="20577"/>
-      <pc:docMkLst>
-        <pc:docMk/>
-      </pc:docMkLst>
-      <pc:sldChg chg="modSp">
-        <pc:chgData name="Martin Linka" userId="S::linka@student.vspj.cz::6ac17739-01f6-41b6-b551-05cfd3691ae0" providerId="AD" clId="Web-{6F7FDFBA-89CE-4A86-BCCE-E48FC4237A03}" dt="2020-11-05T17:13:13.711" v="57" actId="20577"/>
-        <pc:sldMkLst>
-          <pc:docMk/>
-          <pc:sldMk cId="2751309796" sldId="257"/>
-        </pc:sldMkLst>
-        <pc:spChg chg="mod">
-          <ac:chgData name="Martin Linka" userId="S::linka@student.vspj.cz::6ac17739-01f6-41b6-b551-05cfd3691ae0" providerId="AD" clId="Web-{6F7FDFBA-89CE-4A86-BCCE-E48FC4237A03}" dt="2020-11-05T17:13:13.711" v="57" actId="20577"/>
-          <ac:spMkLst>
-            <pc:docMk/>
-            <pc:sldMk cId="2751309796" sldId="257"/>
-            <ac:spMk id="3" creationId="{2553469C-DF1D-4C4F-83B9-240140DFC0FA}"/>
-          </ac:spMkLst>
-        </pc:spChg>
-      </pc:sldChg>
-    </pc:docChg>
-  </pc:docChgLst>
-</pc:chgInfo>
 </file>
 
 <file path=ppt/slideLayouts/slideLayout1.xml><?xml version="1.0" encoding="utf-8"?>
@@ -1278,7 +354,7 @@
           <a:p>
             <a:fld id="{4BDF68E2-58F2-4D09-BE8B-E3BD06533059}" type="datetimeFigureOut">
               <a:rPr lang="en-US" dirty="0"/>
-              <a:t>11/5/2020</a:t>
+              <a:t>12/2/2020</a:t>
             </a:fld>
             <a:endParaRPr lang="en-US"/>
           </a:p>
@@ -1484,7 +560,7 @@
           <a:p>
             <a:fld id="{2E2D6473-DF6D-4702-B328-E0DD40540A4E}" type="datetimeFigureOut">
               <a:rPr lang="en-US" dirty="0"/>
-              <a:t>11/5/2020</a:t>
+              <a:t>12/2/2020</a:t>
             </a:fld>
             <a:endParaRPr lang="en-US"/>
           </a:p>
@@ -1738,7 +814,7 @@
           <a:p>
             <a:fld id="{E26F7E3A-B166-407D-9866-32884E7D5B37}" type="datetimeFigureOut">
               <a:rPr lang="en-US" dirty="0"/>
-              <a:t>11/5/2020</a:t>
+              <a:t>12/2/2020</a:t>
             </a:fld>
             <a:endParaRPr lang="en-US"/>
           </a:p>
@@ -1910,7 +986,7 @@
           <a:p>
             <a:fld id="{528FC5F6-F338-4AE4-BB23-26385BCFC423}" type="datetimeFigureOut">
               <a:rPr lang="en-US" dirty="0"/>
-              <a:t>11/5/2020</a:t>
+              <a:t>12/2/2020</a:t>
             </a:fld>
             <a:endParaRPr lang="en-US"/>
           </a:p>
@@ -2252,7 +1328,7 @@
           <a:p>
             <a:fld id="{20EBB0C4-6273-4C6E-B9BD-2EDC30F1CD52}" type="datetimeFigureOut">
               <a:rPr lang="en-US" dirty="0"/>
-              <a:t>11/5/2020</a:t>
+              <a:t>12/2/2020</a:t>
             </a:fld>
             <a:endParaRPr lang="en-US"/>
           </a:p>
@@ -2524,7 +1600,7 @@
           <a:p>
             <a:fld id="{19AB4D41-86C1-4908-B66A-0B50CEB3BF29}" type="datetimeFigureOut">
               <a:rPr lang="en-US" dirty="0"/>
-              <a:t>11/5/2020</a:t>
+              <a:t>12/2/2020</a:t>
             </a:fld>
             <a:endParaRPr lang="en-US"/>
           </a:p>
@@ -2900,7 +1976,7 @@
           <a:p>
             <a:fld id="{E6426E2C-56C1-4E0D-A793-0088A7FDD37E}" type="datetimeFigureOut">
               <a:rPr lang="en-US" dirty="0"/>
-              <a:t>11/5/2020</a:t>
+              <a:t>12/2/2020</a:t>
             </a:fld>
             <a:endParaRPr lang="en-US"/>
           </a:p>
@@ -3017,7 +2093,7 @@
           <a:p>
             <a:fld id="{C8C39B41-D8B5-4052-B551-9B5525EAA8B6}" type="datetimeFigureOut">
               <a:rPr lang="en-US" dirty="0"/>
-              <a:t>11/5/2020</a:t>
+              <a:t>12/2/2020</a:t>
             </a:fld>
             <a:endParaRPr lang="en-US"/>
           </a:p>
@@ -3188,7 +2264,7 @@
           <a:p>
             <a:fld id="{4D94136C-8742-45B2-AF27-D93DF72833A9}" type="datetimeFigureOut">
               <a:rPr lang="en-US" dirty="0"/>
-              <a:t>11/5/2020</a:t>
+              <a:t>12/2/2020</a:t>
             </a:fld>
             <a:endParaRPr lang="en-US"/>
           </a:p>
@@ -3541,7 +2617,7 @@
           <a:p>
             <a:fld id="{32ABBEA6-7C60-4B02-AE87-00D78D8422AF}" type="datetimeFigureOut">
               <a:rPr lang="en-US" dirty="0"/>
-              <a:t>11/5/2020</a:t>
+              <a:t>12/2/2020</a:t>
             </a:fld>
             <a:endParaRPr lang="en-US"/>
           </a:p>
@@ -3919,7 +2995,7 @@
           <a:p>
             <a:fld id="{C9CAD897-D46E-4AD2-BD9B-49DD3E640873}" type="datetimeFigureOut">
               <a:rPr lang="en-US" dirty="0"/>
-              <a:t>11/5/2020</a:t>
+              <a:t>12/2/2020</a:t>
             </a:fld>
             <a:endParaRPr lang="en-US"/>
           </a:p>
@@ -4204,7 +3280,7 @@
           <a:p>
             <a:fld id="{98624D31-43A5-475A-80CF-332C9F6DCF35}" type="datetimeFigureOut">
               <a:rPr lang="en-US" dirty="0"/>
-              <a:t>11/5/2020</a:t>
+              <a:t>12/2/2020</a:t>
             </a:fld>
             <a:endParaRPr lang="en-US"/>
           </a:p>
@@ -4786,6 +3862,226 @@
 </p:sld>
 </file>
 
+<file path=ppt/slides/slide10.xml><?xml version="1.0" encoding="utf-8"?>
+<p:sld xmlns:a="http://schemas.openxmlformats.org/drawingml/2006/main" xmlns:r="http://schemas.openxmlformats.org/officeDocument/2006/relationships" xmlns:p="http://schemas.openxmlformats.org/presentationml/2006/main">
+  <p:cSld>
+    <p:spTree>
+      <p:nvGrpSpPr>
+        <p:cNvPr id="1" name=""/>
+        <p:cNvGrpSpPr/>
+        <p:nvPr/>
+      </p:nvGrpSpPr>
+      <p:grpSpPr>
+        <a:xfrm>
+          <a:off x="0" y="0"/>
+          <a:ext cx="0" cy="0"/>
+          <a:chOff x="0" y="0"/>
+          <a:chExt cx="0" cy="0"/>
+        </a:xfrm>
+      </p:grpSpPr>
+      <p:sp>
+        <p:nvSpPr>
+          <p:cNvPr id="2" name="Nadpis 1">
+            <a:extLst>
+              <a:ext uri="{FF2B5EF4-FFF2-40B4-BE49-F238E27FC236}">
+                <a16:creationId xmlns:a16="http://schemas.microsoft.com/office/drawing/2014/main" id="{42D9A6D5-8C69-4578-BB48-2877A7E0A6FD}"/>
+              </a:ext>
+            </a:extLst>
+          </p:cNvPr>
+          <p:cNvSpPr>
+            <a:spLocks noGrp="1"/>
+          </p:cNvSpPr>
+          <p:nvPr>
+            <p:ph type="title"/>
+          </p:nvPr>
+        </p:nvSpPr>
+        <p:spPr/>
+        <p:txBody>
+          <a:bodyPr/>
+          <a:lstStyle/>
+          <a:p>
+            <a:r>
+              <a:rPr lang="cs-CZ">
+                <a:cs typeface="Calibri Light"/>
+              </a:rPr>
+              <a:t>Dotazy</a:t>
+            </a:r>
+          </a:p>
+        </p:txBody>
+      </p:sp>
+      <p:sp>
+        <p:nvSpPr>
+          <p:cNvPr id="4" name="Zástupný obsah 3">
+            <a:extLst>
+              <a:ext uri="{FF2B5EF4-FFF2-40B4-BE49-F238E27FC236}">
+                <a16:creationId xmlns:a16="http://schemas.microsoft.com/office/drawing/2014/main" id="{52DFB3D5-8584-4E5C-8A24-CB2537B02B16}"/>
+              </a:ext>
+            </a:extLst>
+          </p:cNvPr>
+          <p:cNvSpPr>
+            <a:spLocks noGrp="1"/>
+          </p:cNvSpPr>
+          <p:nvPr>
+            <p:ph sz="half" idx="2"/>
+          </p:nvPr>
+        </p:nvSpPr>
+        <p:spPr/>
+        <p:txBody>
+          <a:bodyPr/>
+          <a:lstStyle/>
+          <a:p>
+            <a:endParaRPr lang="cs-CZ"/>
+          </a:p>
+        </p:txBody>
+      </p:sp>
+      <p:sp>
+        <p:nvSpPr>
+          <p:cNvPr id="8" name="Zástupný obsah 7">
+            <a:extLst>
+              <a:ext uri="{FF2B5EF4-FFF2-40B4-BE49-F238E27FC236}">
+                <a16:creationId xmlns:a16="http://schemas.microsoft.com/office/drawing/2014/main" id="{74D53889-CE4D-4E41-8305-EEFBEDEF1603}"/>
+              </a:ext>
+            </a:extLst>
+          </p:cNvPr>
+          <p:cNvSpPr>
+            <a:spLocks noGrp="1"/>
+          </p:cNvSpPr>
+          <p:nvPr>
+            <p:ph sz="half" idx="1"/>
+          </p:nvPr>
+        </p:nvSpPr>
+        <p:spPr/>
+        <p:txBody>
+          <a:bodyPr/>
+          <a:lstStyle/>
+          <a:p>
+            <a:endParaRPr lang="cs-CZ"/>
+          </a:p>
+        </p:txBody>
+      </p:sp>
+    </p:spTree>
+    <p:extLst>
+      <p:ext uri="{BB962C8B-B14F-4D97-AF65-F5344CB8AC3E}">
+        <p14:creationId xmlns:p14="http://schemas.microsoft.com/office/powerpoint/2010/main" val="1774785827"/>
+      </p:ext>
+    </p:extLst>
+  </p:cSld>
+  <p:clrMapOvr>
+    <a:masterClrMapping/>
+  </p:clrMapOvr>
+</p:sld>
+</file>
+
+<file path=ppt/slides/slide11.xml><?xml version="1.0" encoding="utf-8"?>
+<p:sld xmlns:a="http://schemas.openxmlformats.org/drawingml/2006/main" xmlns:r="http://schemas.openxmlformats.org/officeDocument/2006/relationships" xmlns:p="http://schemas.openxmlformats.org/presentationml/2006/main">
+  <p:cSld>
+    <p:spTree>
+      <p:nvGrpSpPr>
+        <p:cNvPr id="1" name=""/>
+        <p:cNvGrpSpPr/>
+        <p:nvPr/>
+      </p:nvGrpSpPr>
+      <p:grpSpPr>
+        <a:xfrm>
+          <a:off x="0" y="0"/>
+          <a:ext cx="0" cy="0"/>
+          <a:chOff x="0" y="0"/>
+          <a:chExt cx="0" cy="0"/>
+        </a:xfrm>
+      </p:grpSpPr>
+      <p:sp>
+        <p:nvSpPr>
+          <p:cNvPr id="2" name="Nadpis 1">
+            <a:extLst>
+              <a:ext uri="{FF2B5EF4-FFF2-40B4-BE49-F238E27FC236}">
+                <a16:creationId xmlns:a16="http://schemas.microsoft.com/office/drawing/2014/main" id="{42D9A6D5-8C69-4578-BB48-2877A7E0A6FD}"/>
+              </a:ext>
+            </a:extLst>
+          </p:cNvPr>
+          <p:cNvSpPr>
+            <a:spLocks noGrp="1"/>
+          </p:cNvSpPr>
+          <p:nvPr>
+            <p:ph type="title"/>
+          </p:nvPr>
+        </p:nvSpPr>
+        <p:spPr/>
+        <p:txBody>
+          <a:bodyPr/>
+          <a:lstStyle/>
+          <a:p>
+            <a:r>
+              <a:rPr lang="cs-CZ">
+                <a:cs typeface="Calibri Light"/>
+              </a:rPr>
+              <a:t>Děkujeme za pozornost</a:t>
+            </a:r>
+          </a:p>
+        </p:txBody>
+      </p:sp>
+      <p:sp>
+        <p:nvSpPr>
+          <p:cNvPr id="4" name="Zástupný obsah 3">
+            <a:extLst>
+              <a:ext uri="{FF2B5EF4-FFF2-40B4-BE49-F238E27FC236}">
+                <a16:creationId xmlns:a16="http://schemas.microsoft.com/office/drawing/2014/main" id="{52DFB3D5-8584-4E5C-8A24-CB2537B02B16}"/>
+              </a:ext>
+            </a:extLst>
+          </p:cNvPr>
+          <p:cNvSpPr>
+            <a:spLocks noGrp="1"/>
+          </p:cNvSpPr>
+          <p:nvPr>
+            <p:ph sz="half" idx="2"/>
+          </p:nvPr>
+        </p:nvSpPr>
+        <p:spPr/>
+        <p:txBody>
+          <a:bodyPr/>
+          <a:lstStyle/>
+          <a:p>
+            <a:endParaRPr lang="cs-CZ"/>
+          </a:p>
+        </p:txBody>
+      </p:sp>
+      <p:sp>
+        <p:nvSpPr>
+          <p:cNvPr id="8" name="Zástupný obsah 7">
+            <a:extLst>
+              <a:ext uri="{FF2B5EF4-FFF2-40B4-BE49-F238E27FC236}">
+                <a16:creationId xmlns:a16="http://schemas.microsoft.com/office/drawing/2014/main" id="{74D53889-CE4D-4E41-8305-EEFBEDEF1603}"/>
+              </a:ext>
+            </a:extLst>
+          </p:cNvPr>
+          <p:cNvSpPr>
+            <a:spLocks noGrp="1"/>
+          </p:cNvSpPr>
+          <p:nvPr>
+            <p:ph sz="half" idx="1"/>
+          </p:nvPr>
+        </p:nvSpPr>
+        <p:spPr/>
+        <p:txBody>
+          <a:bodyPr/>
+          <a:lstStyle/>
+          <a:p>
+            <a:endParaRPr lang="cs-CZ"/>
+          </a:p>
+        </p:txBody>
+      </p:sp>
+    </p:spTree>
+    <p:extLst>
+      <p:ext uri="{BB962C8B-B14F-4D97-AF65-F5344CB8AC3E}">
+        <p14:creationId xmlns:p14="http://schemas.microsoft.com/office/powerpoint/2010/main" val="1140955540"/>
+      </p:ext>
+    </p:extLst>
+  </p:cSld>
+  <p:clrMapOvr>
+    <a:masterClrMapping/>
+  </p:clrMapOvr>
+</p:sld>
+</file>
+
 <file path=ppt/slides/slide2.xml><?xml version="1.0" encoding="utf-8"?>
 <p:sld xmlns:a="http://schemas.openxmlformats.org/drawingml/2006/main" xmlns:r="http://schemas.openxmlformats.org/officeDocument/2006/relationships" xmlns:p="http://schemas.openxmlformats.org/presentationml/2006/main">
   <p:cSld>
@@ -4865,41 +4161,7 @@
               <a:rPr lang="cs-CZ">
                 <a:cs typeface="Calibri"/>
               </a:rPr>
-              <a:t>Vytvoření administrativního portálu, pro zakládání zákaznických </a:t>
-            </a:r>
-            <a:r>
-              <a:rPr lang="cs-CZ" err="1">
-                <a:cs typeface="Calibri"/>
-              </a:rPr>
-              <a:t>nextcloud</a:t>
-            </a:r>
-            <a:r>
-              <a:rPr lang="cs-CZ">
-                <a:cs typeface="Calibri"/>
-              </a:rPr>
-              <a:t> instancí.</a:t>
-            </a:r>
-          </a:p>
-          <a:p>
-            <a:r>
-              <a:rPr lang="cs-CZ">
-                <a:cs typeface="Calibri"/>
-              </a:rPr>
-              <a:t>Budeme konkurencí MS Office365 a Google </a:t>
-            </a:r>
-            <a:r>
-              <a:rPr lang="cs-CZ" err="1">
-                <a:cs typeface="Calibri"/>
-              </a:rPr>
-              <a:t>Gsuite</a:t>
-            </a:r>
-          </a:p>
-          <a:p>
-            <a:r>
-              <a:rPr lang="cs-CZ">
-                <a:cs typeface="Calibri"/>
-              </a:rPr>
-              <a:t>Dodáme na míru software řešení dle požadavku zákazníka</a:t>
+              <a:t>Vytvoření administrativního portálu pro správu redakce a publikování článků.</a:t>
             </a:r>
           </a:p>
         </p:txBody>
@@ -4956,7 +4218,7 @@
           <a:lstStyle/>
           <a:p>
             <a:r>
-              <a:rPr lang="cs-CZ">
+              <a:rPr lang="cs-CZ" dirty="0">
                 <a:cs typeface="Calibri Light"/>
               </a:rPr>
               <a:t>Náš tým</a:t>
@@ -4964,520 +4226,542 @@
           </a:p>
         </p:txBody>
       </p:sp>
-      <p:pic>
-        <p:nvPicPr>
-          <p:cNvPr id="4" name="Obrázek 4">
+      <p:grpSp>
+        <p:nvGrpSpPr>
+          <p:cNvPr id="3" name="Skupina 2">
             <a:extLst>
               <a:ext uri="{FF2B5EF4-FFF2-40B4-BE49-F238E27FC236}">
-                <a16:creationId xmlns:a16="http://schemas.microsoft.com/office/drawing/2014/main" id="{7836ABFF-B874-446C-840A-7C63E3CBB8FB}"/>
+                <a16:creationId xmlns:a16="http://schemas.microsoft.com/office/drawing/2014/main" id="{040D81CB-4324-4992-85ED-0A61EF2EBB6F}"/>
               </a:ext>
             </a:extLst>
           </p:cNvPr>
-          <p:cNvPicPr>
-            <a:picLocks noGrp="1" noChangeAspect="1"/>
-          </p:cNvPicPr>
-          <p:nvPr>
-            <p:ph idx="1"/>
-          </p:nvPr>
-        </p:nvPicPr>
-        <p:blipFill>
-          <a:blip r:embed="rId2"/>
-          <a:stretch>
-            <a:fillRect/>
-          </a:stretch>
-        </p:blipFill>
-        <p:spPr>
+          <p:cNvGrpSpPr/>
+          <p:nvPr/>
+        </p:nvGrpSpPr>
+        <p:grpSpPr>
           <a:xfrm>
-            <a:off x="1359936" y="2066983"/>
-            <a:ext cx="1539276" cy="1539276"/>
+            <a:off x="5768427" y="2173133"/>
+            <a:ext cx="2084359" cy="2185607"/>
+            <a:chOff x="6354614" y="2164010"/>
+            <a:chExt cx="2084359" cy="2185607"/>
           </a:xfrm>
-        </p:spPr>
-      </p:pic>
-      <p:sp>
-        <p:nvSpPr>
-          <p:cNvPr id="7" name="TextovéPole 6">
+        </p:grpSpPr>
+        <p:pic>
+          <p:nvPicPr>
+            <p:cNvPr id="8" name="Obrázek 8">
+              <a:extLst>
+                <a:ext uri="{FF2B5EF4-FFF2-40B4-BE49-F238E27FC236}">
+                  <a16:creationId xmlns:a16="http://schemas.microsoft.com/office/drawing/2014/main" id="{A4A6C9E7-5407-4440-AFC6-4F2AE8B116D7}"/>
+                </a:ext>
+              </a:extLst>
+            </p:cNvPr>
+            <p:cNvPicPr>
+              <a:picLocks noChangeAspect="1"/>
+            </p:cNvPicPr>
+            <p:nvPr/>
+          </p:nvPicPr>
+          <p:blipFill rotWithShape="1">
+            <a:blip r:embed="rId2">
+              <a:extLst>
+                <a:ext uri="{BEBA8EAE-BF5A-486C-A8C5-ECC9F3942E4B}">
+                  <a14:imgProps xmlns:a14="http://schemas.microsoft.com/office/drawing/2010/main">
+                    <a14:imgLayer r:embed="rId3">
+                      <a14:imgEffect>
+                        <a14:backgroundRemoval t="3056" b="91389" l="1902" r="97097">
+                          <a14:foregroundMark x1="36537" y1="75185" x2="36537" y2="75185"/>
+                          <a14:foregroundMark x1="53153" y1="74352" x2="53153" y2="74352"/>
+                          <a14:foregroundMark x1="38038" y1="81389" x2="50651" y2="83519"/>
+                          <a14:foregroundMark x1="44344" y1="87870" x2="50951" y2="87870"/>
+                          <a14:foregroundMark x1="82983" y1="67778" x2="87988" y2="52407"/>
+                          <a14:foregroundMark x1="64364" y1="87315" x2="69269" y2="83241"/>
+                          <a14:foregroundMark x1="86486" y1="70741" x2="85886" y2="39167"/>
+                          <a14:foregroundMark x1="90490" y1="53519" x2="81982" y2="29259"/>
+                          <a14:foregroundMark x1="74975" y1="45648" x2="90591" y2="34167"/>
+                          <a14:foregroundMark x1="16216" y1="68796" x2="6507" y2="41296"/>
+                          <a14:foregroundMark x1="6507" y1="41296" x2="17017" y2="56389"/>
+                          <a14:foregroundMark x1="8408" y1="65000" x2="16316" y2="36852"/>
+                          <a14:foregroundMark x1="16316" y1="36852" x2="26827" y2="29815"/>
+                          <a14:foregroundMark x1="5706" y1="39907" x2="26527" y2="22500"/>
+                          <a14:foregroundMark x1="51952" y1="8889" x2="51952" y2="8889"/>
+                          <a14:foregroundMark x1="56557" y1="5278" x2="56557" y2="5278"/>
+                          <a14:foregroundMark x1="49650" y1="3241" x2="49650" y2="3241"/>
+                          <a14:foregroundMark x1="44244" y1="3056" x2="44244" y2="3056"/>
+                          <a14:foregroundMark x1="33033" y1="6111" x2="17518" y2="15185"/>
+                          <a14:foregroundMark x1="2102" y1="47037" x2="2102" y2="47037"/>
+                          <a14:foregroundMark x1="3403" y1="47315" x2="12312" y2="61111"/>
+                          <a14:foregroundMark x1="82182" y1="22963" x2="78679" y2="16759"/>
+                          <a14:foregroundMark x1="50350" y1="3241" x2="55856" y2="3241"/>
+                          <a14:foregroundMark x1="66166" y1="7222" x2="82482" y2="17222"/>
+                          <a14:foregroundMark x1="91391" y1="38889" x2="87888" y2="64630"/>
+                          <a14:foregroundMark x1="83083" y1="79259" x2="91191" y2="66481"/>
+                          <a14:foregroundMark x1="50851" y1="74074" x2="58559" y2="65000"/>
+                          <a14:foregroundMark x1="44545" y1="70926" x2="58659" y2="77500"/>
+                          <a14:foregroundMark x1="47147" y1="77963" x2="65465" y2="74907"/>
+                          <a14:foregroundMark x1="20721" y1="79074" x2="10010" y2="64907"/>
+                          <a14:foregroundMark x1="23023" y1="81574" x2="14414" y2="76667"/>
+                          <a14:foregroundMark x1="48649" y1="91481" x2="48649" y2="91481"/>
+                          <a14:foregroundMark x1="91191" y1="57963" x2="91191" y2="57963"/>
+                          <a14:foregroundMark x1="93994" y1="38704" x2="89089" y2="63889"/>
+                          <a14:foregroundMark x1="85085" y1="27685" x2="97097" y2="41852"/>
+                          <a14:backgroundMark x1="4104" y1="83981" x2="12713" y2="87315"/>
+                          <a14:backgroundMark x1="89389" y1="89444" x2="99800" y2="82870"/>
+                          <a14:backgroundMark x1="88188" y1="85000" x2="97197" y2="71759"/>
+                        </a14:backgroundRemoval>
+                      </a14:imgEffect>
+                    </a14:imgLayer>
+                  </a14:imgProps>
+                </a:ext>
+              </a:extLst>
+            </a:blip>
+            <a:srcRect b="7120"/>
+            <a:stretch/>
+          </p:blipFill>
+          <p:spPr>
+            <a:xfrm>
+              <a:off x="6621853" y="2164010"/>
+              <a:ext cx="1549881" cy="1539276"/>
+            </a:xfrm>
+            <a:prstGeom prst="rect">
+              <a:avLst/>
+            </a:prstGeom>
+          </p:spPr>
+        </p:pic>
+        <p:sp>
+          <p:nvSpPr>
+            <p:cNvPr id="9" name="TextovéPole 8">
+              <a:extLst>
+                <a:ext uri="{FF2B5EF4-FFF2-40B4-BE49-F238E27FC236}">
+                  <a16:creationId xmlns:a16="http://schemas.microsoft.com/office/drawing/2014/main" id="{E5E04CF1-039B-4410-97A1-3CB0309F27B5}"/>
+                </a:ext>
+              </a:extLst>
+            </p:cNvPr>
+            <p:cNvSpPr txBox="1"/>
+            <p:nvPr/>
+          </p:nvSpPr>
+          <p:spPr>
+            <a:xfrm>
+              <a:off x="6354614" y="3703286"/>
+              <a:ext cx="2084359" cy="646331"/>
+            </a:xfrm>
+            <a:prstGeom prst="rect">
+              <a:avLst/>
+            </a:prstGeom>
+            <a:noFill/>
+          </p:spPr>
+          <p:txBody>
+            <a:bodyPr rot="0" spcFirstLastPara="0" vertOverflow="overflow" horzOverflow="overflow" vert="horz" wrap="square" lIns="91440" tIns="45720" rIns="91440" bIns="45720" numCol="1" spcCol="0" rtlCol="0" fromWordArt="0" anchor="t" anchorCtr="0" forceAA="0" compatLnSpc="1">
+              <a:prstTxWarp prst="textNoShape">
+                <a:avLst/>
+              </a:prstTxWarp>
+              <a:spAutoFit/>
+            </a:bodyPr>
+            <a:lstStyle/>
+            <a:p>
+              <a:pPr algn="ctr"/>
+              <a:r>
+                <a:rPr lang="cs-CZ" dirty="0">
+                  <a:ea typeface="+mn-lt"/>
+                  <a:cs typeface="+mn-lt"/>
+                </a:rPr>
+                <a:t>Tereza Chaloupková</a:t>
+              </a:r>
+              <a:br>
+                <a:rPr lang="cs-CZ" dirty="0">
+                  <a:ea typeface="+mn-lt"/>
+                  <a:cs typeface="+mn-lt"/>
+                </a:rPr>
+              </a:br>
+              <a:r>
+                <a:rPr lang="cs-CZ" b="1" dirty="0">
+                  <a:ea typeface="+mn-lt"/>
+                  <a:cs typeface="+mn-lt"/>
+                </a:rPr>
+                <a:t>PO</a:t>
+              </a:r>
+              <a:endParaRPr lang="cs-CZ" sz="2000" b="1" dirty="0">
+                <a:cs typeface="Calibri"/>
+              </a:endParaRPr>
+            </a:p>
+          </p:txBody>
+        </p:sp>
+      </p:grpSp>
+      <p:grpSp>
+        <p:nvGrpSpPr>
+          <p:cNvPr id="6" name="Skupina 5">
             <a:extLst>
               <a:ext uri="{FF2B5EF4-FFF2-40B4-BE49-F238E27FC236}">
-                <a16:creationId xmlns:a16="http://schemas.microsoft.com/office/drawing/2014/main" id="{66089042-3DB0-49D8-93CF-2A8F70D9FFAF}"/>
+                <a16:creationId xmlns:a16="http://schemas.microsoft.com/office/drawing/2014/main" id="{FB10DCCC-348F-48FE-A4DF-102F96385229}"/>
               </a:ext>
             </a:extLst>
           </p:cNvPr>
-          <p:cNvSpPr txBox="1"/>
+          <p:cNvGrpSpPr/>
           <p:nvPr/>
-        </p:nvSpPr>
-        <p:spPr>
+        </p:nvGrpSpPr>
+        <p:grpSpPr>
           <a:xfrm>
-            <a:off x="1100407" y="3832106"/>
-            <a:ext cx="3160143" cy="400110"/>
+            <a:off x="3432854" y="2176875"/>
+            <a:ext cx="2084359" cy="2178123"/>
+            <a:chOff x="9043812" y="2164010"/>
+            <a:chExt cx="2084359" cy="2178123"/>
           </a:xfrm>
-          <a:prstGeom prst="rect">
-            <a:avLst/>
-          </a:prstGeom>
-          <a:noFill/>
-        </p:spPr>
-        <p:txBody>
-          <a:bodyPr rot="0" spcFirstLastPara="0" vertOverflow="overflow" horzOverflow="overflow" vert="horz" wrap="square" lIns="91440" tIns="45720" rIns="91440" bIns="45720" numCol="1" spcCol="0" rtlCol="0" fromWordArt="0" anchor="t" anchorCtr="0" forceAA="0" compatLnSpc="1">
-            <a:prstTxWarp prst="textNoShape">
+        </p:grpSpPr>
+        <p:sp>
+          <p:nvSpPr>
+            <p:cNvPr id="30" name="TextovéPole 29">
+              <a:extLst>
+                <a:ext uri="{FF2B5EF4-FFF2-40B4-BE49-F238E27FC236}">
+                  <a16:creationId xmlns:a16="http://schemas.microsoft.com/office/drawing/2014/main" id="{C021AD2A-444A-4D9F-995C-C22A4678A868}"/>
+                </a:ext>
+              </a:extLst>
+            </p:cNvPr>
+            <p:cNvSpPr txBox="1"/>
+            <p:nvPr/>
+          </p:nvSpPr>
+          <p:spPr>
+            <a:xfrm>
+              <a:off x="9043812" y="3695802"/>
+              <a:ext cx="2084359" cy="646331"/>
+            </a:xfrm>
+            <a:prstGeom prst="rect">
               <a:avLst/>
-            </a:prstTxWarp>
-            <a:spAutoFit/>
-          </a:bodyPr>
-          <a:lstStyle/>
-          <a:p>
-            <a:r>
-              <a:rPr lang="cs-CZ">
+            </a:prstGeom>
+            <a:noFill/>
+          </p:spPr>
+          <p:txBody>
+            <a:bodyPr rot="0" spcFirstLastPara="0" vertOverflow="overflow" horzOverflow="overflow" vert="horz" wrap="square" lIns="91440" tIns="45720" rIns="91440" bIns="45720" numCol="1" spcCol="0" rtlCol="0" fromWordArt="0" anchor="t" anchorCtr="0" forceAA="0" compatLnSpc="1">
+              <a:prstTxWarp prst="textNoShape">
+                <a:avLst/>
+              </a:prstTxWarp>
+              <a:spAutoFit/>
+            </a:bodyPr>
+            <a:lstStyle/>
+            <a:p>
+              <a:pPr algn="ctr"/>
+              <a:r>
+                <a:rPr lang="cs-CZ">
+                  <a:ea typeface="+mn-lt"/>
+                  <a:cs typeface="+mn-lt"/>
+                </a:rPr>
+                <a:t>Martin Doležal</a:t>
+              </a:r>
+              <a:br>
+                <a:rPr lang="cs-CZ">
+                  <a:ea typeface="+mn-lt"/>
+                  <a:cs typeface="+mn-lt"/>
+                </a:rPr>
+              </a:br>
+              <a:r>
+                <a:rPr lang="cs-CZ" b="1">
+                  <a:ea typeface="+mn-lt"/>
+                  <a:cs typeface="+mn-lt"/>
+                </a:rPr>
+                <a:t>TM</a:t>
+              </a:r>
+              <a:endParaRPr lang="cs-CZ" sz="2000" b="1">
                 <a:cs typeface="Calibri"/>
-              </a:rPr>
-              <a:t>Martin linka-</a:t>
-            </a:r>
-            <a:r>
-              <a:rPr lang="cs-CZ" sz="2000" b="1" err="1">
-                <a:cs typeface="Calibri"/>
-              </a:rPr>
-              <a:t>scrum</a:t>
-            </a:r>
-            <a:r>
-              <a:rPr lang="cs-CZ" sz="2000" b="1">
-                <a:cs typeface="Calibri"/>
-              </a:rPr>
-              <a:t> master</a:t>
-            </a:r>
-          </a:p>
-        </p:txBody>
-      </p:sp>
-      <p:pic>
-        <p:nvPicPr>
-          <p:cNvPr id="8" name="Obrázek 8">
+              </a:endParaRPr>
+            </a:p>
+          </p:txBody>
+        </p:sp>
+        <p:pic>
+          <p:nvPicPr>
+            <p:cNvPr id="31" name="Obrázek 4">
+              <a:extLst>
+                <a:ext uri="{FF2B5EF4-FFF2-40B4-BE49-F238E27FC236}">
+                  <a16:creationId xmlns:a16="http://schemas.microsoft.com/office/drawing/2014/main" id="{5101A560-5E42-445A-8B4B-BF27ED0DD345}"/>
+                </a:ext>
+              </a:extLst>
+            </p:cNvPr>
+            <p:cNvPicPr>
+              <a:picLocks noChangeAspect="1"/>
+            </p:cNvPicPr>
+            <p:nvPr/>
+          </p:nvPicPr>
+          <p:blipFill>
+            <a:blip r:embed="rId4"/>
+            <a:stretch>
+              <a:fillRect/>
+            </a:stretch>
+          </p:blipFill>
+          <p:spPr>
+            <a:xfrm>
+              <a:off x="9316353" y="2164010"/>
+              <a:ext cx="1539276" cy="1539276"/>
+            </a:xfrm>
+            <a:prstGeom prst="rect">
+              <a:avLst/>
+            </a:prstGeom>
+          </p:spPr>
+        </p:pic>
+      </p:grpSp>
+      <p:grpSp>
+        <p:nvGrpSpPr>
+          <p:cNvPr id="32" name="Skupina 31">
             <a:extLst>
               <a:ext uri="{FF2B5EF4-FFF2-40B4-BE49-F238E27FC236}">
-                <a16:creationId xmlns:a16="http://schemas.microsoft.com/office/drawing/2014/main" id="{A4A6C9E7-5407-4440-AFC6-4F2AE8B116D7}"/>
+                <a16:creationId xmlns:a16="http://schemas.microsoft.com/office/drawing/2014/main" id="{29F9B857-F084-4200-80C4-B5B25D508F16}"/>
               </a:ext>
             </a:extLst>
           </p:cNvPr>
-          <p:cNvPicPr>
-            <a:picLocks noChangeAspect="1"/>
-          </p:cNvPicPr>
+          <p:cNvGrpSpPr/>
           <p:nvPr/>
-        </p:nvPicPr>
-        <p:blipFill>
-          <a:blip r:embed="rId3"/>
-          <a:stretch>
-            <a:fillRect/>
-          </a:stretch>
-        </p:blipFill>
-        <p:spPr>
+        </p:nvGrpSpPr>
+        <p:grpSpPr>
           <a:xfrm>
-            <a:off x="8980098" y="2003698"/>
-            <a:ext cx="1549881" cy="1657284"/>
+            <a:off x="1097280" y="2176875"/>
+            <a:ext cx="2084359" cy="2178123"/>
+            <a:chOff x="9043812" y="2164010"/>
+            <a:chExt cx="2084359" cy="2178123"/>
           </a:xfrm>
-          <a:prstGeom prst="rect">
-            <a:avLst/>
-          </a:prstGeom>
-        </p:spPr>
-      </p:pic>
-      <p:sp>
-        <p:nvSpPr>
-          <p:cNvPr id="9" name="TextovéPole 8">
+        </p:grpSpPr>
+        <p:sp>
+          <p:nvSpPr>
+            <p:cNvPr id="33" name="TextovéPole 32">
+              <a:extLst>
+                <a:ext uri="{FF2B5EF4-FFF2-40B4-BE49-F238E27FC236}">
+                  <a16:creationId xmlns:a16="http://schemas.microsoft.com/office/drawing/2014/main" id="{4E7DF420-32EC-401E-8B9C-79F5F83AAE6E}"/>
+                </a:ext>
+              </a:extLst>
+            </p:cNvPr>
+            <p:cNvSpPr txBox="1"/>
+            <p:nvPr/>
+          </p:nvSpPr>
+          <p:spPr>
+            <a:xfrm>
+              <a:off x="9043812" y="3695802"/>
+              <a:ext cx="2084359" cy="646331"/>
+            </a:xfrm>
+            <a:prstGeom prst="rect">
+              <a:avLst/>
+            </a:prstGeom>
+            <a:noFill/>
+          </p:spPr>
+          <p:txBody>
+            <a:bodyPr rot="0" spcFirstLastPara="0" vertOverflow="overflow" horzOverflow="overflow" vert="horz" wrap="square" lIns="91440" tIns="45720" rIns="91440" bIns="45720" numCol="1" spcCol="0" rtlCol="0" fromWordArt="0" anchor="t" anchorCtr="0" forceAA="0" compatLnSpc="1">
+              <a:prstTxWarp prst="textNoShape">
+                <a:avLst/>
+              </a:prstTxWarp>
+              <a:spAutoFit/>
+            </a:bodyPr>
+            <a:lstStyle/>
+            <a:p>
+              <a:pPr algn="ctr"/>
+              <a:r>
+                <a:rPr lang="cs-CZ" dirty="0">
+                  <a:ea typeface="+mn-lt"/>
+                  <a:cs typeface="+mn-lt"/>
+                </a:rPr>
+                <a:t>Martin Linka</a:t>
+              </a:r>
+              <a:br>
+                <a:rPr lang="cs-CZ" dirty="0">
+                  <a:ea typeface="+mn-lt"/>
+                  <a:cs typeface="+mn-lt"/>
+                </a:rPr>
+              </a:br>
+              <a:r>
+                <a:rPr lang="cs-CZ" b="1" dirty="0">
+                  <a:ea typeface="+mn-lt"/>
+                  <a:cs typeface="+mn-lt"/>
+                </a:rPr>
+                <a:t>SM</a:t>
+              </a:r>
+              <a:endParaRPr lang="cs-CZ" sz="2000" b="1" dirty="0">
+                <a:cs typeface="Calibri"/>
+              </a:endParaRPr>
+            </a:p>
+          </p:txBody>
+        </p:sp>
+        <p:pic>
+          <p:nvPicPr>
+            <p:cNvPr id="34" name="Obrázek 4">
+              <a:extLst>
+                <a:ext uri="{FF2B5EF4-FFF2-40B4-BE49-F238E27FC236}">
+                  <a16:creationId xmlns:a16="http://schemas.microsoft.com/office/drawing/2014/main" id="{B767C74C-D8C0-48E2-8BDC-B5F04697D93F}"/>
+                </a:ext>
+              </a:extLst>
+            </p:cNvPr>
+            <p:cNvPicPr>
+              <a:picLocks noChangeAspect="1"/>
+            </p:cNvPicPr>
+            <p:nvPr/>
+          </p:nvPicPr>
+          <p:blipFill>
+            <a:blip r:embed="rId4"/>
+            <a:stretch>
+              <a:fillRect/>
+            </a:stretch>
+          </p:blipFill>
+          <p:spPr>
+            <a:xfrm>
+              <a:off x="9316353" y="2164010"/>
+              <a:ext cx="1539276" cy="1539276"/>
+            </a:xfrm>
+            <a:prstGeom prst="rect">
+              <a:avLst/>
+            </a:prstGeom>
+          </p:spPr>
+        </p:pic>
+      </p:grpSp>
+      <p:grpSp>
+        <p:nvGrpSpPr>
+          <p:cNvPr id="15" name="Skupina 14">
             <a:extLst>
               <a:ext uri="{FF2B5EF4-FFF2-40B4-BE49-F238E27FC236}">
-                <a16:creationId xmlns:a16="http://schemas.microsoft.com/office/drawing/2014/main" id="{E5E04CF1-039B-4410-97A1-3CB0309F27B5}"/>
+                <a16:creationId xmlns:a16="http://schemas.microsoft.com/office/drawing/2014/main" id="{F3B9AEBD-54AA-4830-94A7-60AD7810DA22}"/>
               </a:ext>
             </a:extLst>
           </p:cNvPr>
-          <p:cNvSpPr txBox="1"/>
+          <p:cNvGrpSpPr/>
           <p:nvPr/>
-        </p:nvSpPr>
-        <p:spPr>
+        </p:nvGrpSpPr>
+        <p:grpSpPr>
           <a:xfrm>
-            <a:off x="8173168" y="3831207"/>
-            <a:ext cx="3692103" cy="400110"/>
+            <a:off x="8120025" y="2173133"/>
+            <a:ext cx="2475961" cy="2181865"/>
+            <a:chOff x="6354614" y="2167752"/>
+            <a:chExt cx="2475961" cy="2181865"/>
           </a:xfrm>
-          <a:prstGeom prst="rect">
-            <a:avLst/>
-          </a:prstGeom>
-          <a:noFill/>
-        </p:spPr>
-        <p:txBody>
-          <a:bodyPr rot="0" spcFirstLastPara="0" vertOverflow="overflow" horzOverflow="overflow" vert="horz" wrap="square" lIns="91440" tIns="45720" rIns="91440" bIns="45720" numCol="1" spcCol="0" rtlCol="0" fromWordArt="0" anchor="t" anchorCtr="0" forceAA="0" compatLnSpc="1">
-            <a:prstTxWarp prst="textNoShape">
+        </p:grpSpPr>
+        <p:pic>
+          <p:nvPicPr>
+            <p:cNvPr id="16" name="Obrázek 8">
+              <a:extLst>
+                <a:ext uri="{FF2B5EF4-FFF2-40B4-BE49-F238E27FC236}">
+                  <a16:creationId xmlns:a16="http://schemas.microsoft.com/office/drawing/2014/main" id="{0017F95D-D5E1-416E-BB90-8B0CEEF455DA}"/>
+                </a:ext>
+              </a:extLst>
+            </p:cNvPr>
+            <p:cNvPicPr>
+              <a:picLocks noChangeAspect="1"/>
+            </p:cNvPicPr>
+            <p:nvPr/>
+          </p:nvPicPr>
+          <p:blipFill rotWithShape="1">
+            <a:blip r:embed="rId2">
+              <a:extLst>
+                <a:ext uri="{BEBA8EAE-BF5A-486C-A8C5-ECC9F3942E4B}">
+                  <a14:imgProps xmlns:a14="http://schemas.microsoft.com/office/drawing/2010/main">
+                    <a14:imgLayer r:embed="rId3">
+                      <a14:imgEffect>
+                        <a14:backgroundRemoval t="3056" b="91389" l="1902" r="97097">
+                          <a14:foregroundMark x1="36537" y1="75185" x2="36537" y2="75185"/>
+                          <a14:foregroundMark x1="53153" y1="74352" x2="53153" y2="74352"/>
+                          <a14:foregroundMark x1="38038" y1="81389" x2="50651" y2="83519"/>
+                          <a14:foregroundMark x1="44344" y1="87870" x2="50951" y2="87870"/>
+                          <a14:foregroundMark x1="82983" y1="67778" x2="87988" y2="52407"/>
+                          <a14:foregroundMark x1="64364" y1="87315" x2="69269" y2="83241"/>
+                          <a14:foregroundMark x1="86486" y1="70741" x2="85886" y2="39167"/>
+                          <a14:foregroundMark x1="90490" y1="53519" x2="81982" y2="29259"/>
+                          <a14:foregroundMark x1="74975" y1="45648" x2="90591" y2="34167"/>
+                          <a14:foregroundMark x1="16216" y1="68796" x2="6507" y2="41296"/>
+                          <a14:foregroundMark x1="6507" y1="41296" x2="17017" y2="56389"/>
+                          <a14:foregroundMark x1="8408" y1="65000" x2="16316" y2="36852"/>
+                          <a14:foregroundMark x1="16316" y1="36852" x2="26827" y2="29815"/>
+                          <a14:foregroundMark x1="5706" y1="39907" x2="26527" y2="22500"/>
+                          <a14:foregroundMark x1="51952" y1="8889" x2="51952" y2="8889"/>
+                          <a14:foregroundMark x1="56557" y1="5278" x2="56557" y2="5278"/>
+                          <a14:foregroundMark x1="49650" y1="3241" x2="49650" y2="3241"/>
+                          <a14:foregroundMark x1="44244" y1="3056" x2="44244" y2="3056"/>
+                          <a14:foregroundMark x1="33033" y1="6111" x2="17518" y2="15185"/>
+                          <a14:foregroundMark x1="2102" y1="47037" x2="2102" y2="47037"/>
+                          <a14:foregroundMark x1="3403" y1="47315" x2="12312" y2="61111"/>
+                          <a14:foregroundMark x1="82182" y1="22963" x2="78679" y2="16759"/>
+                          <a14:foregroundMark x1="50350" y1="3241" x2="55856" y2="3241"/>
+                          <a14:foregroundMark x1="66166" y1="7222" x2="82482" y2="17222"/>
+                          <a14:foregroundMark x1="91391" y1="38889" x2="87888" y2="64630"/>
+                          <a14:foregroundMark x1="83083" y1="79259" x2="91191" y2="66481"/>
+                          <a14:foregroundMark x1="50851" y1="74074" x2="58559" y2="65000"/>
+                          <a14:foregroundMark x1="44545" y1="70926" x2="58659" y2="77500"/>
+                          <a14:foregroundMark x1="47147" y1="77963" x2="65465" y2="74907"/>
+                          <a14:foregroundMark x1="20721" y1="79074" x2="10010" y2="64907"/>
+                          <a14:foregroundMark x1="23023" y1="81574" x2="14414" y2="76667"/>
+                          <a14:foregroundMark x1="48649" y1="91481" x2="48649" y2="91481"/>
+                          <a14:foregroundMark x1="91191" y1="57963" x2="91191" y2="57963"/>
+                          <a14:foregroundMark x1="93994" y1="38704" x2="89089" y2="63889"/>
+                          <a14:foregroundMark x1="85085" y1="27685" x2="97097" y2="41852"/>
+                          <a14:backgroundMark x1="4104" y1="83981" x2="12713" y2="87315"/>
+                          <a14:backgroundMark x1="89389" y1="89444" x2="99800" y2="82870"/>
+                          <a14:backgroundMark x1="88188" y1="85000" x2="97197" y2="71759"/>
+                        </a14:backgroundRemoval>
+                      </a14:imgEffect>
+                    </a14:imgLayer>
+                  </a14:imgProps>
+                </a:ext>
+              </a:extLst>
+            </a:blip>
+            <a:srcRect b="7120"/>
+            <a:stretch/>
+          </p:blipFill>
+          <p:spPr>
+            <a:xfrm>
+              <a:off x="6817653" y="2167752"/>
+              <a:ext cx="1549881" cy="1539276"/>
+            </a:xfrm>
+            <a:prstGeom prst="rect">
               <a:avLst/>
-            </a:prstTxWarp>
-            <a:spAutoFit/>
-          </a:bodyPr>
-          <a:lstStyle/>
-          <a:p>
-            <a:r>
-              <a:rPr lang="cs-CZ">
-                <a:ea typeface="+mn-lt"/>
-                <a:cs typeface="+mn-lt"/>
-              </a:rPr>
-              <a:t>Chaloupková Tereza-</a:t>
-            </a:r>
-            <a:r>
-              <a:rPr lang="cs-CZ" sz="2000" b="1" err="1">
-                <a:ea typeface="+mn-lt"/>
-                <a:cs typeface="+mn-lt"/>
-              </a:rPr>
-              <a:t>product</a:t>
-            </a:r>
-            <a:r>
-              <a:rPr lang="cs-CZ" sz="2000" b="1">
-                <a:ea typeface="+mn-lt"/>
-                <a:cs typeface="+mn-lt"/>
-              </a:rPr>
-              <a:t> </a:t>
-            </a:r>
-            <a:r>
-              <a:rPr lang="cs-CZ" sz="2000" b="1" err="1">
-                <a:ea typeface="+mn-lt"/>
-                <a:cs typeface="+mn-lt"/>
-              </a:rPr>
-              <a:t>owner</a:t>
-            </a:r>
-            <a:endParaRPr lang="cs-CZ" sz="2000" b="1">
-              <a:cs typeface="Calibri"/>
-            </a:endParaRPr>
-          </a:p>
-        </p:txBody>
-      </p:sp>
-      <p:pic>
-        <p:nvPicPr>
-          <p:cNvPr id="11" name="Obrázek 4" descr="Obsah obrázku kreslení&#10;&#10;Popis se vygeneroval automaticky.">
-            <a:extLst>
-              <a:ext uri="{FF2B5EF4-FFF2-40B4-BE49-F238E27FC236}">
-                <a16:creationId xmlns:a16="http://schemas.microsoft.com/office/drawing/2014/main" id="{25B6E6AE-B211-423F-9A69-813935CD0733}"/>
-              </a:ext>
-            </a:extLst>
-          </p:cNvPr>
-          <p:cNvPicPr>
-            <a:picLocks noChangeAspect="1"/>
-          </p:cNvPicPr>
-          <p:nvPr/>
-        </p:nvPicPr>
-        <p:blipFill>
-          <a:blip r:embed="rId2"/>
-          <a:stretch>
-            <a:fillRect/>
-          </a:stretch>
-        </p:blipFill>
-        <p:spPr>
-          <a:xfrm>
-            <a:off x="4603468" y="4476628"/>
-            <a:ext cx="1194220" cy="1222975"/>
-          </a:xfrm>
-          <a:prstGeom prst="rect">
-            <a:avLst/>
-          </a:prstGeom>
-        </p:spPr>
-      </p:pic>
-      <p:pic>
-        <p:nvPicPr>
-          <p:cNvPr id="13" name="Obrázek 4" descr="Obsah obrázku kreslení&#10;&#10;Popis se vygeneroval automaticky.">
-            <a:extLst>
-              <a:ext uri="{FF2B5EF4-FFF2-40B4-BE49-F238E27FC236}">
-                <a16:creationId xmlns:a16="http://schemas.microsoft.com/office/drawing/2014/main" id="{805479D7-F782-4922-A89B-705ED56C0A5A}"/>
-              </a:ext>
-            </a:extLst>
-          </p:cNvPr>
-          <p:cNvPicPr>
-            <a:picLocks noChangeAspect="1"/>
-          </p:cNvPicPr>
-          <p:nvPr/>
-        </p:nvPicPr>
-        <p:blipFill>
-          <a:blip r:embed="rId2"/>
-          <a:stretch>
-            <a:fillRect/>
-          </a:stretch>
-        </p:blipFill>
-        <p:spPr>
-          <a:xfrm>
-            <a:off x="2671152" y="4571518"/>
-            <a:ext cx="1122333" cy="1122333"/>
-          </a:xfrm>
-          <a:prstGeom prst="rect">
-            <a:avLst/>
-          </a:prstGeom>
-        </p:spPr>
-      </p:pic>
-      <p:pic>
-        <p:nvPicPr>
-          <p:cNvPr id="14" name="Obrázek 8" descr="Obsah obrázku kreslení&#10;&#10;Popis se vygeneroval automaticky.">
-            <a:extLst>
-              <a:ext uri="{FF2B5EF4-FFF2-40B4-BE49-F238E27FC236}">
-                <a16:creationId xmlns:a16="http://schemas.microsoft.com/office/drawing/2014/main" id="{52DDD4A6-83DA-4EC3-9B49-675D81740623}"/>
-              </a:ext>
-            </a:extLst>
-          </p:cNvPr>
-          <p:cNvPicPr>
-            <a:picLocks noChangeAspect="1"/>
-          </p:cNvPicPr>
-          <p:nvPr/>
-        </p:nvPicPr>
-        <p:blipFill>
-          <a:blip r:embed="rId3"/>
-          <a:stretch>
-            <a:fillRect/>
-          </a:stretch>
-        </p:blipFill>
-        <p:spPr>
-          <a:xfrm>
-            <a:off x="8232475" y="4433471"/>
-            <a:ext cx="1204825" cy="1297850"/>
-          </a:xfrm>
-          <a:prstGeom prst="rect">
-            <a:avLst/>
-          </a:prstGeom>
-        </p:spPr>
-      </p:pic>
-      <p:sp>
-        <p:nvSpPr>
-          <p:cNvPr id="16" name="TextovéPole 15">
-            <a:extLst>
-              <a:ext uri="{FF2B5EF4-FFF2-40B4-BE49-F238E27FC236}">
-                <a16:creationId xmlns:a16="http://schemas.microsoft.com/office/drawing/2014/main" id="{CBF2DC52-4562-498F-AD59-2705CFEA45A3}"/>
-              </a:ext>
-            </a:extLst>
-          </p:cNvPr>
-          <p:cNvSpPr txBox="1"/>
-          <p:nvPr/>
-        </p:nvSpPr>
-        <p:spPr>
-          <a:xfrm>
-            <a:off x="5037107" y="3829409"/>
-            <a:ext cx="2743200" cy="461665"/>
-          </a:xfrm>
-          <a:prstGeom prst="rect">
-            <a:avLst/>
-          </a:prstGeom>
-          <a:noFill/>
-        </p:spPr>
-        <p:txBody>
-          <a:bodyPr rot="0" spcFirstLastPara="0" vertOverflow="overflow" horzOverflow="overflow" vert="horz" wrap="square" lIns="91440" tIns="45720" rIns="91440" bIns="45720" numCol="1" spcCol="0" rtlCol="0" fromWordArt="0" anchor="t" anchorCtr="0" forceAA="0" compatLnSpc="1">
-            <a:prstTxWarp prst="textNoShape">
+            </a:prstGeom>
+          </p:spPr>
+        </p:pic>
+        <p:sp>
+          <p:nvSpPr>
+            <p:cNvPr id="19" name="TextovéPole 18">
+              <a:extLst>
+                <a:ext uri="{FF2B5EF4-FFF2-40B4-BE49-F238E27FC236}">
+                  <a16:creationId xmlns:a16="http://schemas.microsoft.com/office/drawing/2014/main" id="{3054BA2E-1D4C-46AD-A860-23210953E440}"/>
+                </a:ext>
+              </a:extLst>
+            </p:cNvPr>
+            <p:cNvSpPr txBox="1"/>
+            <p:nvPr/>
+          </p:nvSpPr>
+          <p:spPr>
+            <a:xfrm>
+              <a:off x="6354614" y="3703286"/>
+              <a:ext cx="2475961" cy="646331"/>
+            </a:xfrm>
+            <a:prstGeom prst="rect">
               <a:avLst/>
-            </a:prstTxWarp>
-            <a:spAutoFit/>
-          </a:bodyPr>
-          <a:lstStyle/>
-          <a:p>
-            <a:pPr algn="l"/>
-            <a:r>
-              <a:rPr lang="cs-CZ" sz="2400" b="1">
+            </a:prstGeom>
+            <a:noFill/>
+          </p:spPr>
+          <p:txBody>
+            <a:bodyPr rot="0" spcFirstLastPara="0" vertOverflow="overflow" horzOverflow="overflow" vert="horz" wrap="square" lIns="91440" tIns="45720" rIns="91440" bIns="45720" numCol="1" spcCol="0" rtlCol="0" fromWordArt="0" anchor="t" anchorCtr="0" forceAA="0" compatLnSpc="1">
+              <a:prstTxWarp prst="textNoShape">
+                <a:avLst/>
+              </a:prstTxWarp>
+              <a:spAutoFit/>
+            </a:bodyPr>
+            <a:lstStyle/>
+            <a:p>
+              <a:pPr algn="ctr"/>
+              <a:r>
+                <a:rPr lang="cs-CZ">
+                  <a:cs typeface="Calibri"/>
+                </a:rPr>
+                <a:t>MVDr.</a:t>
+              </a:r>
+              <a:r>
+                <a:rPr lang="cs-CZ">
+                  <a:ea typeface="+mn-lt"/>
+                  <a:cs typeface="+mn-lt"/>
+                </a:rPr>
+                <a:t> Stuchlíková Pavla </a:t>
+              </a:r>
+              <a:r>
+                <a:rPr lang="cs-CZ" b="1">
+                  <a:ea typeface="+mn-lt"/>
+                  <a:cs typeface="+mn-lt"/>
+                </a:rPr>
+                <a:t>TM</a:t>
+              </a:r>
+              <a:endParaRPr lang="cs-CZ" b="1">
                 <a:cs typeface="Calibri"/>
-              </a:rPr>
-              <a:t>Programátoři:</a:t>
-            </a:r>
-            <a:endParaRPr lang="cs-CZ"/>
-          </a:p>
-        </p:txBody>
-      </p:sp>
-      <p:sp>
-        <p:nvSpPr>
-          <p:cNvPr id="17" name="TextovéPole 16">
-            <a:extLst>
-              <a:ext uri="{FF2B5EF4-FFF2-40B4-BE49-F238E27FC236}">
-                <a16:creationId xmlns:a16="http://schemas.microsoft.com/office/drawing/2014/main" id="{AD808365-616E-47E1-AEC5-D19C58FAEE2C}"/>
-              </a:ext>
-            </a:extLst>
-          </p:cNvPr>
-          <p:cNvSpPr txBox="1"/>
-          <p:nvPr/>
-        </p:nvSpPr>
-        <p:spPr>
-          <a:xfrm>
-            <a:off x="2592058" y="5884473"/>
-            <a:ext cx="2743200" cy="369332"/>
-          </a:xfrm>
-          <a:prstGeom prst="rect">
-            <a:avLst/>
-          </a:prstGeom>
-          <a:noFill/>
-        </p:spPr>
-        <p:txBody>
-          <a:bodyPr rot="0" spcFirstLastPara="0" vertOverflow="overflow" horzOverflow="overflow" vert="horz" wrap="square" lIns="91440" tIns="45720" rIns="91440" bIns="45720" numCol="1" spcCol="0" rtlCol="0" fromWordArt="0" anchor="t" anchorCtr="0" forceAA="0" compatLnSpc="1">
-            <a:prstTxWarp prst="textNoShape">
-              <a:avLst/>
-            </a:prstTxWarp>
-            <a:spAutoFit/>
-          </a:bodyPr>
-          <a:lstStyle/>
-          <a:p>
-            <a:r>
-              <a:rPr lang="cs-CZ">
-                <a:ea typeface="+mn-lt"/>
-                <a:cs typeface="+mn-lt"/>
-              </a:rPr>
-              <a:t>Bobka Lukáš</a:t>
-            </a:r>
-            <a:endParaRPr lang="cs-CZ">
-              <a:cs typeface="Calibri"/>
-            </a:endParaRPr>
-          </a:p>
-        </p:txBody>
-      </p:sp>
-      <p:sp>
-        <p:nvSpPr>
-          <p:cNvPr id="18" name="TextovéPole 17">
-            <a:extLst>
-              <a:ext uri="{FF2B5EF4-FFF2-40B4-BE49-F238E27FC236}">
-                <a16:creationId xmlns:a16="http://schemas.microsoft.com/office/drawing/2014/main" id="{23DDC28C-021B-4866-82E3-0E1166E286A3}"/>
-              </a:ext>
-            </a:extLst>
-          </p:cNvPr>
-          <p:cNvSpPr txBox="1"/>
-          <p:nvPr/>
-        </p:nvSpPr>
-        <p:spPr>
-          <a:xfrm>
-            <a:off x="4503348" y="5883575"/>
-            <a:ext cx="2743200" cy="369332"/>
-          </a:xfrm>
-          <a:prstGeom prst="rect">
-            <a:avLst/>
-          </a:prstGeom>
-          <a:noFill/>
-        </p:spPr>
-        <p:txBody>
-          <a:bodyPr rot="0" spcFirstLastPara="0" vertOverflow="overflow" horzOverflow="overflow" vert="horz" wrap="square" lIns="91440" tIns="45720" rIns="91440" bIns="45720" numCol="1" spcCol="0" rtlCol="0" fromWordArt="0" anchor="t" anchorCtr="0" forceAA="0" compatLnSpc="1">
-            <a:prstTxWarp prst="textNoShape">
-              <a:avLst/>
-            </a:prstTxWarp>
-            <a:spAutoFit/>
-          </a:bodyPr>
-          <a:lstStyle/>
-          <a:p>
-            <a:r>
-              <a:rPr lang="cs-CZ">
-                <a:ea typeface="+mn-lt"/>
-                <a:cs typeface="+mn-lt"/>
-              </a:rPr>
-              <a:t>Staněk Ondřej</a:t>
-            </a:r>
-            <a:endParaRPr lang="cs-CZ"/>
-          </a:p>
-        </p:txBody>
-      </p:sp>
-      <p:pic>
-        <p:nvPicPr>
-          <p:cNvPr id="19" name="Obrázek 4" descr="Obsah obrázku kreslení&#10;&#10;Popis se vygeneroval automaticky.">
-            <a:extLst>
-              <a:ext uri="{FF2B5EF4-FFF2-40B4-BE49-F238E27FC236}">
-                <a16:creationId xmlns:a16="http://schemas.microsoft.com/office/drawing/2014/main" id="{50DC1ED1-E129-46B4-B06C-2A7DCD3606BD}"/>
-              </a:ext>
-            </a:extLst>
-          </p:cNvPr>
-          <p:cNvPicPr>
-            <a:picLocks noChangeAspect="1"/>
-          </p:cNvPicPr>
-          <p:nvPr/>
-        </p:nvPicPr>
-        <p:blipFill>
-          <a:blip r:embed="rId2"/>
-          <a:stretch>
-            <a:fillRect/>
-          </a:stretch>
-        </p:blipFill>
-        <p:spPr>
-          <a:xfrm>
-            <a:off x="6415014" y="4476628"/>
-            <a:ext cx="1093579" cy="1222974"/>
-          </a:xfrm>
-          <a:prstGeom prst="rect">
-            <a:avLst/>
-          </a:prstGeom>
-        </p:spPr>
-      </p:pic>
-      <p:sp>
-        <p:nvSpPr>
-          <p:cNvPr id="20" name="TextovéPole 19">
-            <a:extLst>
-              <a:ext uri="{FF2B5EF4-FFF2-40B4-BE49-F238E27FC236}">
-                <a16:creationId xmlns:a16="http://schemas.microsoft.com/office/drawing/2014/main" id="{9ED59EB9-4877-4730-A785-90465AE15D4F}"/>
-              </a:ext>
-            </a:extLst>
-          </p:cNvPr>
-          <p:cNvSpPr txBox="1"/>
-          <p:nvPr/>
-        </p:nvSpPr>
-        <p:spPr>
-          <a:xfrm>
-            <a:off x="7766110" y="5882676"/>
-            <a:ext cx="2743200" cy="369332"/>
-          </a:xfrm>
-          <a:prstGeom prst="rect">
-            <a:avLst/>
-          </a:prstGeom>
-          <a:noFill/>
-        </p:spPr>
-        <p:txBody>
-          <a:bodyPr rot="0" spcFirstLastPara="0" vertOverflow="overflow" horzOverflow="overflow" vert="horz" wrap="square" lIns="91440" tIns="45720" rIns="91440" bIns="45720" numCol="1" spcCol="0" rtlCol="0" fromWordArt="0" anchor="t" anchorCtr="0" forceAA="0" compatLnSpc="1">
-            <a:prstTxWarp prst="textNoShape">
-              <a:avLst/>
-            </a:prstTxWarp>
-            <a:spAutoFit/>
-          </a:bodyPr>
-          <a:lstStyle/>
-          <a:p>
-            <a:r>
-              <a:rPr lang="cs-CZ">
-                <a:cs typeface="Calibri"/>
-              </a:rPr>
-              <a:t>MVDr.</a:t>
-            </a:r>
-            <a:r>
-              <a:rPr lang="cs-CZ">
-                <a:ea typeface="+mn-lt"/>
-                <a:cs typeface="+mn-lt"/>
-              </a:rPr>
-              <a:t> Stuchlíková Pavla</a:t>
-            </a:r>
-            <a:endParaRPr lang="cs-CZ">
-              <a:cs typeface="Calibri"/>
-            </a:endParaRPr>
-          </a:p>
-        </p:txBody>
-      </p:sp>
-      <p:sp>
-        <p:nvSpPr>
-          <p:cNvPr id="21" name="TextovéPole 20">
-            <a:extLst>
-              <a:ext uri="{FF2B5EF4-FFF2-40B4-BE49-F238E27FC236}">
-                <a16:creationId xmlns:a16="http://schemas.microsoft.com/office/drawing/2014/main" id="{3DFC01E0-8456-4F9D-A13C-7E14438FCCC0}"/>
-              </a:ext>
-            </a:extLst>
-          </p:cNvPr>
-          <p:cNvSpPr txBox="1"/>
-          <p:nvPr/>
-        </p:nvSpPr>
-        <p:spPr>
-          <a:xfrm>
-            <a:off x="6126192" y="5881777"/>
-            <a:ext cx="2743200" cy="369332"/>
-          </a:xfrm>
-          <a:prstGeom prst="rect">
-            <a:avLst/>
-          </a:prstGeom>
-          <a:noFill/>
-        </p:spPr>
-        <p:txBody>
-          <a:bodyPr rot="0" spcFirstLastPara="0" vertOverflow="overflow" horzOverflow="overflow" vert="horz" wrap="square" lIns="91440" tIns="45720" rIns="91440" bIns="45720" numCol="1" spcCol="0" rtlCol="0" fromWordArt="0" anchor="t" anchorCtr="0" forceAA="0" compatLnSpc="1">
-            <a:prstTxWarp prst="textNoShape">
-              <a:avLst/>
-            </a:prstTxWarp>
-            <a:spAutoFit/>
-          </a:bodyPr>
-          <a:lstStyle/>
-          <a:p>
-            <a:r>
-              <a:rPr lang="cs-CZ">
-                <a:cs typeface="Calibri"/>
-              </a:rPr>
-              <a:t>Martin Doležal</a:t>
-            </a:r>
-          </a:p>
-        </p:txBody>
-      </p:sp>
+              </a:endParaRPr>
+            </a:p>
+          </p:txBody>
+        </p:sp>
+      </p:grpSp>
     </p:spTree>
     <p:extLst>
       <p:ext uri="{BB962C8B-B14F-4D97-AF65-F5344CB8AC3E}">
@@ -5530,10 +4814,10 @@
           <a:lstStyle/>
           <a:p>
             <a:r>
-              <a:rPr lang="cs-CZ">
+              <a:rPr lang="cs-CZ" dirty="0">
                 <a:cs typeface="Calibri Light"/>
               </a:rPr>
-              <a:t>Návrh řešení</a:t>
+              <a:t>Návrh řešení – Martin L</a:t>
             </a:r>
           </a:p>
         </p:txBody>
@@ -5577,8 +4861,11 @@
               <a:rPr lang="cs-CZ" err="1">
                 <a:cs typeface="Calibri"/>
               </a:rPr>
-              <a:t>Nextcloud</a:t>
-            </a:r>
+              <a:t>Wordpress</a:t>
+            </a:r>
+            <a:endParaRPr lang="cs-CZ">
+              <a:cs typeface="Calibri"/>
+            </a:endParaRPr>
           </a:p>
           <a:p>
             <a:pPr marL="383540" lvl="1"/>
@@ -5598,20 +4885,17 @@
               <a:rPr lang="cs-CZ">
                 <a:cs typeface="Calibri"/>
               </a:rPr>
-              <a:t> </a:t>
+              <a:t> CMS řešení, počátek roku </a:t>
             </a:r>
             <a:r>
               <a:rPr lang="cs-CZ" err="1">
                 <a:cs typeface="Calibri"/>
               </a:rPr>
-              <a:t>file-sharing</a:t>
-            </a:r>
-            <a:r>
-              <a:rPr lang="cs-CZ">
-                <a:cs typeface="Calibri"/>
-              </a:rPr>
-              <a:t> řešení, počátek roku 2008</a:t>
-            </a:r>
+              <a:t>xx</a:t>
+            </a:r>
+            <a:endParaRPr lang="cs-CZ">
+              <a:cs typeface="Calibri"/>
+            </a:endParaRPr>
           </a:p>
           <a:p>
             <a:pPr marL="383540" lvl="1"/>
@@ -5625,7 +4909,19 @@
               <a:rPr lang="cs-CZ" err="1">
                 <a:cs typeface="Calibri"/>
               </a:rPr>
-              <a:t>messaging</a:t>
+              <a:t>todo</a:t>
+            </a:r>
+            <a:r>
+              <a:rPr lang="cs-CZ">
+                <a:cs typeface="Calibri"/>
+              </a:rPr>
+              <a:t>, SSO, </a:t>
+            </a:r>
+            <a:r>
+              <a:rPr lang="cs-CZ" err="1">
+                <a:cs typeface="Calibri"/>
+              </a:rPr>
+              <a:t>notifier</a:t>
             </a:r>
             <a:r>
               <a:rPr lang="cs-CZ">
@@ -5637,37 +4933,13 @@
               <a:rPr lang="cs-CZ" err="1">
                 <a:cs typeface="Calibri"/>
               </a:rPr>
-              <a:t>voice</a:t>
+              <a:t>wysiwyg</a:t>
             </a:r>
             <a:r>
               <a:rPr lang="cs-CZ">
                 <a:cs typeface="Calibri"/>
               </a:rPr>
-              <a:t> call, office </a:t>
-            </a:r>
-            <a:r>
-              <a:rPr lang="cs-CZ" err="1">
-                <a:cs typeface="Calibri"/>
-              </a:rPr>
-              <a:t>suite</a:t>
-            </a:r>
-            <a:r>
-              <a:rPr lang="cs-CZ">
-                <a:cs typeface="Calibri"/>
-              </a:rPr>
-              <a:t>, </a:t>
-            </a:r>
-            <a:r>
-              <a:rPr lang="cs-CZ" err="1">
-                <a:cs typeface="Calibri"/>
-              </a:rPr>
-              <a:t>password</a:t>
-            </a:r>
-            <a:r>
-              <a:rPr lang="cs-CZ">
-                <a:cs typeface="Calibri"/>
-              </a:rPr>
-              <a:t> manager, SSO, atd.)</a:t>
+              <a:t> atd.)</a:t>
             </a:r>
           </a:p>
           <a:p>
@@ -5684,6 +4956,9 @@
               </a:rPr>
               <a:t>RespAPI</a:t>
             </a:r>
+            <a:endParaRPr lang="cs-CZ">
+              <a:cs typeface="Calibri"/>
+            </a:endParaRPr>
           </a:p>
           <a:p>
             <a:pPr marL="200660" lvl="1" indent="0">
@@ -5707,20 +4982,17 @@
               <a:rPr lang="cs-CZ">
                 <a:cs typeface="Calibri"/>
               </a:rPr>
-              <a:t> - </a:t>
+              <a:t> - využití platformy </a:t>
             </a:r>
             <a:r>
               <a:rPr lang="cs-CZ" err="1">
                 <a:cs typeface="Calibri"/>
               </a:rPr>
-              <a:t>vytvořeního</a:t>
-            </a:r>
-            <a:r>
-              <a:rPr lang="cs-CZ">
-                <a:cs typeface="Calibri"/>
-              </a:rPr>
-              <a:t> vlastní webové stránky</a:t>
-            </a:r>
+              <a:t>Wordpress</a:t>
+            </a:r>
+            <a:endParaRPr lang="cs-CZ">
+              <a:cs typeface="Calibri"/>
+            </a:endParaRPr>
           </a:p>
           <a:p>
             <a:pPr marL="383540" lvl="1"/>
@@ -5862,10 +5134,21 @@
           <a:lstStyle/>
           <a:p>
             <a:r>
-              <a:rPr lang="cs-CZ">
+              <a:rPr lang="cs-CZ" dirty="0">
                 <a:cs typeface="Calibri Light"/>
               </a:rPr>
-              <a:t>Aplikační architektura</a:t>
+              <a:t>Aplikační architektura – TODO</a:t>
+            </a:r>
+            <a:br>
+              <a:rPr lang="cs-CZ" dirty="0">
+                <a:cs typeface="Calibri Light"/>
+              </a:rPr>
+            </a:br>
+            <a:r>
+              <a:rPr lang="cs-CZ" dirty="0">
+                <a:cs typeface="Calibri Light"/>
+              </a:rPr>
+              <a:t>Martin L.</a:t>
             </a:r>
           </a:p>
         </p:txBody>
@@ -5894,7 +5177,7 @@
         </p:spPr>
         <p:txBody>
           <a:bodyPr vert="horz" lIns="0" tIns="45720" rIns="0" bIns="45720" rtlCol="0" anchor="t">
-            <a:normAutofit fontScale="92500" lnSpcReduction="10000"/>
+            <a:normAutofit/>
           </a:bodyPr>
           <a:lstStyle/>
           <a:p>
@@ -5902,7 +5185,7 @@
               <a:buNone/>
             </a:pPr>
             <a:r>
-              <a:rPr lang="cs-CZ">
+              <a:rPr lang="cs-CZ" dirty="0">
                 <a:cs typeface="Calibri"/>
               </a:rPr>
               <a:t>Ukázkové řešení v MS Azure</a:t>
@@ -5914,13 +5197,13 @@
               <a:buChar char="§"/>
             </a:pPr>
             <a:r>
-              <a:rPr lang="cs-CZ" err="1">
+              <a:rPr lang="cs-CZ" dirty="0" err="1">
                 <a:cs typeface="Calibri"/>
               </a:rPr>
               <a:t>Backend</a:t>
             </a:r>
             <a:r>
-              <a:rPr lang="cs-CZ">
+              <a:rPr lang="cs-CZ" dirty="0">
                 <a:cs typeface="Calibri"/>
               </a:rPr>
               <a:t> servery:</a:t>
@@ -5932,7 +5215,7 @@
               <a:buChar char="§"/>
             </a:pPr>
             <a:r>
-              <a:rPr lang="cs-CZ">
+              <a:rPr lang="cs-CZ" dirty="0">
                 <a:cs typeface="Calibri"/>
               </a:rPr>
               <a:t>Uživatelský profil</a:t>
@@ -5944,20 +5227,11 @@
               <a:buChar char="§"/>
             </a:pPr>
             <a:r>
-              <a:rPr lang="cs-CZ">
+              <a:rPr lang="cs-CZ" dirty="0">
                 <a:cs typeface="Calibri"/>
               </a:rPr>
-              <a:t>Statistky uživatelských </a:t>
-            </a:r>
-            <a:r>
-              <a:rPr lang="cs-CZ" err="1">
-                <a:cs typeface="Calibri"/>
-              </a:rPr>
-              <a:t>instn</a:t>
-            </a:r>
-            <a:endParaRPr lang="cs-CZ">
-              <a:cs typeface="Calibri"/>
-            </a:endParaRPr>
+              <a:t>Admin portál</a:t>
+            </a:r>
           </a:p>
           <a:p>
             <a:pPr marL="342900" indent="-342900">
@@ -5965,20 +5239,20 @@
               <a:buChar char="§"/>
             </a:pPr>
             <a:r>
-              <a:rPr lang="cs-CZ" err="1">
+              <a:rPr lang="cs-CZ" dirty="0" err="1">
                 <a:ea typeface="+mn-lt"/>
                 <a:cs typeface="+mn-lt"/>
               </a:rPr>
-              <a:t>Fronend</a:t>
-            </a:r>
-            <a:r>
-              <a:rPr lang="cs-CZ">
+              <a:t>Frontend</a:t>
+            </a:r>
+            <a:r>
+              <a:rPr lang="cs-CZ" dirty="0">
                 <a:ea typeface="+mn-lt"/>
                 <a:cs typeface="+mn-lt"/>
               </a:rPr>
               <a:t> servery:</a:t>
             </a:r>
-            <a:endParaRPr lang="en-US">
+            <a:endParaRPr lang="en-US" dirty="0">
               <a:ea typeface="+mn-lt"/>
               <a:cs typeface="+mn-lt"/>
             </a:endParaRPr>
@@ -5989,11 +5263,11 @@
               <a:buChar char="§"/>
             </a:pPr>
             <a:r>
-              <a:rPr lang="cs-CZ">
+              <a:rPr lang="cs-CZ" dirty="0">
                 <a:ea typeface="+mn-lt"/>
                 <a:cs typeface="+mn-lt"/>
               </a:rPr>
-              <a:t>Zobrazují profil</a:t>
+              <a:t>Zobrazují profily</a:t>
             </a:r>
           </a:p>
           <a:p>
@@ -6002,88 +5276,15 @@
               <a:buChar char="§"/>
             </a:pPr>
             <a:r>
-              <a:rPr lang="cs-CZ">
+              <a:rPr lang="cs-CZ" dirty="0">
                 <a:ea typeface="+mn-lt"/>
                 <a:cs typeface="+mn-lt"/>
               </a:rPr>
-              <a:t>Metadata</a:t>
-            </a:r>
-            <a:endParaRPr lang="cs-CZ">
+              <a:t>Články</a:t>
+            </a:r>
+            <a:endParaRPr lang="cs-CZ" dirty="0">
               <a:cs typeface="Calibri"/>
             </a:endParaRPr>
-          </a:p>
-          <a:p>
-            <a:pPr marL="383540" lvl="1">
-              <a:buFont typeface="Wingdings,Sans-Serif" panose="020F0502020204030204" pitchFamily="34" charset="0"/>
-              <a:buChar char="§"/>
-            </a:pPr>
-            <a:endParaRPr lang="cs-CZ">
-              <a:cs typeface="Calibri"/>
-            </a:endParaRPr>
-          </a:p>
-          <a:p>
-            <a:pPr marL="342900" indent="-342900">
-              <a:buFont typeface="Wingdings,Sans-Serif" panose="020F0502020204030204" pitchFamily="34" charset="0"/>
-              <a:buChar char="§"/>
-            </a:pPr>
-            <a:r>
-              <a:rPr lang="cs-CZ" err="1">
-                <a:cs typeface="Calibri"/>
-              </a:rPr>
-              <a:t>Client</a:t>
-            </a:r>
-            <a:r>
-              <a:rPr lang="cs-CZ">
-                <a:cs typeface="Calibri"/>
-              </a:rPr>
-              <a:t> servery:</a:t>
-            </a:r>
-            <a:endParaRPr lang="cs-CZ">
-              <a:ea typeface="+mn-lt"/>
-              <a:cs typeface="+mn-lt"/>
-            </a:endParaRPr>
-          </a:p>
-          <a:p>
-            <a:pPr marL="383540" lvl="1">
-              <a:buFont typeface="Wingdings,Sans-Serif" panose="020F0502020204030204" pitchFamily="34" charset="0"/>
-              <a:buChar char="§"/>
-            </a:pPr>
-            <a:r>
-              <a:rPr lang="cs-CZ">
-                <a:cs typeface="Calibri"/>
-              </a:rPr>
-              <a:t>Samostatné instance </a:t>
-            </a:r>
-            <a:r>
-              <a:rPr lang="cs-CZ" err="1">
-                <a:cs typeface="Calibri"/>
-              </a:rPr>
-              <a:t>Nextcloudu</a:t>
-            </a:r>
-          </a:p>
-          <a:p>
-            <a:pPr marL="383540" lvl="1">
-              <a:buFont typeface="Wingdings,Sans-Serif" panose="020F0502020204030204" pitchFamily="34" charset="0"/>
-              <a:buChar char="§"/>
-            </a:pPr>
-            <a:r>
-              <a:rPr lang="cs-CZ">
-                <a:cs typeface="Calibri"/>
-              </a:rPr>
-              <a:t>Obsahují pouze data klienta</a:t>
-            </a:r>
-          </a:p>
-          <a:p>
-            <a:pPr marL="383540" lvl="1">
-              <a:buFont typeface="Wingdings,Sans-Serif" panose="020F0502020204030204" pitchFamily="34" charset="0"/>
-              <a:buChar char="§"/>
-            </a:pPr>
-            <a:r>
-              <a:rPr lang="cs-CZ">
-                <a:cs typeface="Calibri"/>
-              </a:rPr>
-              <a:t>Klient má zde absolutní kontrolu</a:t>
-            </a:r>
           </a:p>
         </p:txBody>
       </p:sp>
@@ -6168,10 +5369,22 @@
           <a:lstStyle/>
           <a:p>
             <a:r>
-              <a:rPr lang="cs-CZ">
+              <a:rPr lang="cs-CZ" dirty="0">
                 <a:cs typeface="Calibri Light"/>
               </a:rPr>
-              <a:t>Dotazy</a:t>
+              <a:t>Sprint </a:t>
+            </a:r>
+            <a:r>
+              <a:rPr lang="cs-CZ" dirty="0" err="1">
+                <a:cs typeface="Calibri Light"/>
+              </a:rPr>
+              <a:t>progress</a:t>
+            </a:r>
+            <a:r>
+              <a:rPr lang="cs-CZ" dirty="0">
+                <a:cs typeface="Calibri Light"/>
+              </a:rPr>
+              <a:t> - Tes</a:t>
             </a:r>
           </a:p>
         </p:txBody>
@@ -6229,7 +5442,7 @@
     </p:spTree>
     <p:extLst>
       <p:ext uri="{BB962C8B-B14F-4D97-AF65-F5344CB8AC3E}">
-        <p14:creationId xmlns:p14="http://schemas.microsoft.com/office/powerpoint/2010/main" val="1881435807"/>
+        <p14:creationId xmlns:p14="http://schemas.microsoft.com/office/powerpoint/2010/main" val="652036983"/>
       </p:ext>
     </p:extLst>
   </p:cSld>
@@ -6278,28 +5491,108 @@
           <a:lstStyle/>
           <a:p>
             <a:r>
-              <a:rPr lang="cs-CZ">
+              <a:rPr lang="cs-CZ" dirty="0" err="1">
                 <a:cs typeface="Calibri Light"/>
               </a:rPr>
-              <a:t>Děkujeme za pozornost</a:t>
-            </a:r>
-          </a:p>
-        </p:txBody>
-      </p:sp>
-      <p:sp>
-        <p:nvSpPr>
-          <p:cNvPr id="4" name="Zástupný obsah 3">
+              <a:t>Bussiness</a:t>
+            </a:r>
+            <a:r>
+              <a:rPr lang="cs-CZ" dirty="0">
+                <a:cs typeface="Calibri Light"/>
+              </a:rPr>
+              <a:t> </a:t>
+            </a:r>
+            <a:r>
+              <a:rPr lang="cs-CZ" dirty="0" err="1">
+                <a:cs typeface="Calibri Light"/>
+              </a:rPr>
+              <a:t>canvas</a:t>
+            </a:r>
+            <a:r>
+              <a:rPr lang="cs-CZ" dirty="0">
+                <a:cs typeface="Calibri Light"/>
+              </a:rPr>
+              <a:t> - Tes</a:t>
+            </a:r>
+          </a:p>
+        </p:txBody>
+      </p:sp>
+      <p:pic>
+        <p:nvPicPr>
+          <p:cNvPr id="3" name="Zástupný obsah 2">
             <a:extLst>
               <a:ext uri="{FF2B5EF4-FFF2-40B4-BE49-F238E27FC236}">
-                <a16:creationId xmlns:a16="http://schemas.microsoft.com/office/drawing/2014/main" id="{52DFB3D5-8584-4E5C-8A24-CB2537B02B16}"/>
+                <a16:creationId xmlns:a16="http://schemas.microsoft.com/office/drawing/2014/main" id="{A5F9329E-09BF-42AD-8810-EF82AB0E3683}"/>
               </a:ext>
             </a:extLst>
           </p:cNvPr>
-          <p:cNvSpPr>
-            <a:spLocks noGrp="1"/>
-          </p:cNvSpPr>
-          <p:nvPr>
-            <p:ph sz="half" idx="2"/>
+          <p:cNvPicPr>
+            <a:picLocks noGrp="1" noChangeAspect="1"/>
+          </p:cNvPicPr>
+          <p:nvPr>
+            <p:ph sz="half" idx="1"/>
+          </p:nvPr>
+        </p:nvPicPr>
+        <p:blipFill>
+          <a:blip r:embed="rId2"/>
+          <a:stretch>
+            <a:fillRect/>
+          </a:stretch>
+        </p:blipFill>
+        <p:spPr>
+          <a:xfrm>
+            <a:off x="1689926" y="1779437"/>
+            <a:ext cx="8564417" cy="4511523"/>
+          </a:xfrm>
+          <a:prstGeom prst="rect">
+            <a:avLst/>
+          </a:prstGeom>
+        </p:spPr>
+      </p:pic>
+    </p:spTree>
+    <p:extLst>
+      <p:ext uri="{BB962C8B-B14F-4D97-AF65-F5344CB8AC3E}">
+        <p14:creationId xmlns:p14="http://schemas.microsoft.com/office/powerpoint/2010/main" val="1881435807"/>
+      </p:ext>
+    </p:extLst>
+  </p:cSld>
+  <p:clrMapOvr>
+    <a:masterClrMapping/>
+  </p:clrMapOvr>
+</p:sld>
+</file>
+
+<file path=ppt/slides/slide8.xml><?xml version="1.0" encoding="utf-8"?>
+<p:sld xmlns:a="http://schemas.openxmlformats.org/drawingml/2006/main" xmlns:r="http://schemas.openxmlformats.org/officeDocument/2006/relationships" xmlns:p="http://schemas.openxmlformats.org/presentationml/2006/main">
+  <p:cSld>
+    <p:spTree>
+      <p:nvGrpSpPr>
+        <p:cNvPr id="1" name=""/>
+        <p:cNvGrpSpPr/>
+        <p:nvPr/>
+      </p:nvGrpSpPr>
+      <p:grpSpPr>
+        <a:xfrm>
+          <a:off x="0" y="0"/>
+          <a:ext cx="0" cy="0"/>
+          <a:chOff x="0" y="0"/>
+          <a:chExt cx="0" cy="0"/>
+        </a:xfrm>
+      </p:grpSpPr>
+      <p:sp>
+        <p:nvSpPr>
+          <p:cNvPr id="2" name="Nadpis 1">
+            <a:extLst>
+              <a:ext uri="{FF2B5EF4-FFF2-40B4-BE49-F238E27FC236}">
+                <a16:creationId xmlns:a16="http://schemas.microsoft.com/office/drawing/2014/main" id="{42D9A6D5-8C69-4578-BB48-2877A7E0A6FD}"/>
+              </a:ext>
+            </a:extLst>
+          </p:cNvPr>
+          <p:cNvSpPr>
+            <a:spLocks noGrp="1"/>
+          </p:cNvSpPr>
+          <p:nvPr>
+            <p:ph type="title"/>
           </p:nvPr>
         </p:nvSpPr>
         <p:spPr/>
@@ -6307,7 +5600,42 @@
           <a:bodyPr/>
           <a:lstStyle/>
           <a:p>
-            <a:endParaRPr lang="cs-CZ"/>
+            <a:r>
+              <a:rPr lang="cs-CZ" b="1" dirty="0" err="1">
+                <a:cs typeface="Calibri Light"/>
+              </a:rPr>
+              <a:t>Definition</a:t>
+            </a:r>
+            <a:r>
+              <a:rPr lang="cs-CZ" b="1" dirty="0">
+                <a:cs typeface="Calibri Light"/>
+              </a:rPr>
+              <a:t> </a:t>
+            </a:r>
+            <a:r>
+              <a:rPr lang="cs-CZ" b="1" dirty="0" err="1">
+                <a:cs typeface="Calibri Light"/>
+              </a:rPr>
+              <a:t>of</a:t>
+            </a:r>
+            <a:r>
+              <a:rPr lang="cs-CZ" b="1" dirty="0">
+                <a:cs typeface="Calibri Light"/>
+              </a:rPr>
+              <a:t> </a:t>
+            </a:r>
+            <a:r>
+              <a:rPr lang="cs-CZ" b="1" dirty="0" err="1">
+                <a:cs typeface="Calibri Light"/>
+              </a:rPr>
+              <a:t>Ready</a:t>
+            </a:r>
+            <a:r>
+              <a:rPr lang="cs-CZ" b="1" dirty="0">
+                <a:cs typeface="Calibri Light"/>
+              </a:rPr>
+              <a:t> – Martin D</a:t>
+            </a:r>
           </a:p>
         </p:txBody>
       </p:sp>
@@ -6327,19 +5655,353 @@
             <p:ph sz="half" idx="1"/>
           </p:nvPr>
         </p:nvSpPr>
-        <p:spPr/>
-        <p:txBody>
-          <a:bodyPr/>
-          <a:lstStyle/>
-          <a:p>
-            <a:endParaRPr lang="cs-CZ"/>
+        <p:spPr>
+          <a:xfrm>
+            <a:off x="1097279" y="1845734"/>
+            <a:ext cx="10058400" cy="4023360"/>
+          </a:xfrm>
+        </p:spPr>
+        <p:txBody>
+          <a:bodyPr>
+            <a:normAutofit/>
+          </a:bodyPr>
+          <a:lstStyle/>
+          <a:p>
+            <a:pPr marL="0" indent="0">
+              <a:buNone/>
+            </a:pPr>
+            <a:r>
+              <a:rPr lang="cs-CZ" sz="2100" u="sng" dirty="0"/>
+              <a:t>Vytvoření portálu pro redakci</a:t>
+            </a:r>
+            <a:r>
+              <a:rPr lang="cs-CZ" sz="2100" dirty="0"/>
+              <a:t>:</a:t>
+            </a:r>
+            <a:endParaRPr lang="cs-CZ" sz="1900" dirty="0"/>
+          </a:p>
+          <a:p>
+            <a:pPr lvl="1">
+              <a:buFont typeface="Arial" panose="020B0604020202020204" pitchFamily="34" charset="0"/>
+              <a:buChar char="•"/>
+            </a:pPr>
+            <a:r>
+              <a:rPr lang="cs-CZ" sz="1900" dirty="0" err="1"/>
+              <a:t>Bussiness</a:t>
+            </a:r>
+            <a:r>
+              <a:rPr lang="cs-CZ" sz="1900" dirty="0"/>
+              <a:t> </a:t>
+            </a:r>
+            <a:r>
+              <a:rPr lang="cs-CZ" sz="1900" dirty="0" err="1"/>
+              <a:t>Canvas</a:t>
+            </a:r>
+            <a:endParaRPr lang="cs-CZ" sz="1900" dirty="0"/>
+          </a:p>
+          <a:p>
+            <a:pPr lvl="1">
+              <a:buFont typeface="Arial" panose="020B0604020202020204" pitchFamily="34" charset="0"/>
+              <a:buChar char="•"/>
+            </a:pPr>
+            <a:r>
+              <a:rPr lang="cs-CZ" sz="1900" dirty="0"/>
+              <a:t>Definovat produkt</a:t>
+            </a:r>
+          </a:p>
+          <a:p>
+            <a:pPr lvl="1">
+              <a:buFont typeface="Arial" panose="020B0604020202020204" pitchFamily="34" charset="0"/>
+              <a:buChar char="•"/>
+            </a:pPr>
+            <a:r>
+              <a:rPr lang="cs-CZ" sz="1900" dirty="0"/>
+              <a:t>Vymyšlené business procesy (přidání článku, autor x redaktor x čtenář)</a:t>
+            </a:r>
+          </a:p>
+          <a:p>
+            <a:pPr lvl="1">
+              <a:buFont typeface="Arial" panose="020B0604020202020204" pitchFamily="34" charset="0"/>
+              <a:buChar char="•"/>
+            </a:pPr>
+            <a:r>
+              <a:rPr lang="cs-CZ" sz="1900" dirty="0"/>
+              <a:t>Návrh infrastruktury</a:t>
+            </a:r>
+          </a:p>
+          <a:p>
+            <a:pPr lvl="1">
+              <a:buFont typeface="Arial" panose="020B0604020202020204" pitchFamily="34" charset="0"/>
+              <a:buChar char="•"/>
+            </a:pPr>
+            <a:r>
+              <a:rPr lang="cs-CZ" sz="1900" dirty="0"/>
+              <a:t>Rozplánování projektu ve </a:t>
+            </a:r>
+            <a:r>
+              <a:rPr lang="cs-CZ" sz="1900" dirty="0" err="1"/>
+              <a:t>Scrumdesk</a:t>
+            </a:r>
+            <a:endParaRPr lang="cs-CZ" sz="1900" dirty="0"/>
+          </a:p>
+          <a:p>
+            <a:pPr lvl="1">
+              <a:buFont typeface="Arial" panose="020B0604020202020204" pitchFamily="34" charset="0"/>
+              <a:buChar char="•"/>
+            </a:pPr>
+            <a:r>
+              <a:rPr lang="cs-CZ" sz="1900" dirty="0"/>
+              <a:t>Máme </a:t>
+            </a:r>
+            <a:r>
+              <a:rPr lang="cs-CZ" sz="1900" dirty="0" err="1"/>
+              <a:t>Github</a:t>
+            </a:r>
+            <a:endParaRPr lang="cs-CZ" sz="1900" dirty="0"/>
+          </a:p>
+          <a:p>
+            <a:pPr lvl="1">
+              <a:buFont typeface="Arial" panose="020B0604020202020204" pitchFamily="34" charset="0"/>
+              <a:buChar char="•"/>
+            </a:pPr>
+            <a:r>
+              <a:rPr lang="cs-CZ" sz="1900" dirty="0"/>
+              <a:t>Demo verze</a:t>
+            </a:r>
+          </a:p>
+          <a:p>
+            <a:pPr lvl="1">
+              <a:buFont typeface="Arial" panose="020B0604020202020204" pitchFamily="34" charset="0"/>
+              <a:buChar char="•"/>
+            </a:pPr>
+            <a:r>
+              <a:rPr lang="cs-CZ" sz="1900" dirty="0"/>
+              <a:t>Budou se dále přidávat další</a:t>
+            </a:r>
+            <a:br>
+              <a:rPr lang="cs-CZ" dirty="0"/>
+            </a:br>
+            <a:endParaRPr lang="cs-CZ" dirty="0"/>
           </a:p>
         </p:txBody>
       </p:sp>
     </p:spTree>
     <p:extLst>
       <p:ext uri="{BB962C8B-B14F-4D97-AF65-F5344CB8AC3E}">
-        <p14:creationId xmlns:p14="http://schemas.microsoft.com/office/powerpoint/2010/main" val="1140955540"/>
+        <p14:creationId xmlns:p14="http://schemas.microsoft.com/office/powerpoint/2010/main" val="4203507057"/>
+      </p:ext>
+    </p:extLst>
+  </p:cSld>
+  <p:clrMapOvr>
+    <a:masterClrMapping/>
+  </p:clrMapOvr>
+</p:sld>
+</file>
+
+<file path=ppt/slides/slide9.xml><?xml version="1.0" encoding="utf-8"?>
+<p:sld xmlns:a="http://schemas.openxmlformats.org/drawingml/2006/main" xmlns:r="http://schemas.openxmlformats.org/officeDocument/2006/relationships" xmlns:p="http://schemas.openxmlformats.org/presentationml/2006/main">
+  <p:cSld>
+    <p:spTree>
+      <p:nvGrpSpPr>
+        <p:cNvPr id="1" name=""/>
+        <p:cNvGrpSpPr/>
+        <p:nvPr/>
+      </p:nvGrpSpPr>
+      <p:grpSpPr>
+        <a:xfrm>
+          <a:off x="0" y="0"/>
+          <a:ext cx="0" cy="0"/>
+          <a:chOff x="0" y="0"/>
+          <a:chExt cx="0" cy="0"/>
+        </a:xfrm>
+      </p:grpSpPr>
+      <p:sp>
+        <p:nvSpPr>
+          <p:cNvPr id="2" name="Nadpis 1">
+            <a:extLst>
+              <a:ext uri="{FF2B5EF4-FFF2-40B4-BE49-F238E27FC236}">
+                <a16:creationId xmlns:a16="http://schemas.microsoft.com/office/drawing/2014/main" id="{42D9A6D5-8C69-4578-BB48-2877A7E0A6FD}"/>
+              </a:ext>
+            </a:extLst>
+          </p:cNvPr>
+          <p:cNvSpPr>
+            <a:spLocks noGrp="1"/>
+          </p:cNvSpPr>
+          <p:nvPr>
+            <p:ph type="title"/>
+          </p:nvPr>
+        </p:nvSpPr>
+        <p:spPr/>
+        <p:txBody>
+          <a:bodyPr/>
+          <a:lstStyle/>
+          <a:p>
+            <a:r>
+              <a:rPr lang="cs-CZ" b="1" dirty="0" err="1">
+                <a:cs typeface="Calibri Light"/>
+              </a:rPr>
+              <a:t>Definition</a:t>
+            </a:r>
+            <a:r>
+              <a:rPr lang="cs-CZ" b="1" dirty="0">
+                <a:cs typeface="Calibri Light"/>
+              </a:rPr>
+              <a:t> </a:t>
+            </a:r>
+            <a:r>
+              <a:rPr lang="cs-CZ" b="1" dirty="0" err="1">
+                <a:cs typeface="Calibri Light"/>
+              </a:rPr>
+              <a:t>of</a:t>
+            </a:r>
+            <a:r>
+              <a:rPr lang="cs-CZ" b="1" dirty="0">
+                <a:cs typeface="Calibri Light"/>
+              </a:rPr>
+              <a:t> Done -DONE Martin D</a:t>
+            </a:r>
+          </a:p>
+        </p:txBody>
+      </p:sp>
+      <p:sp>
+        <p:nvSpPr>
+          <p:cNvPr id="8" name="Zástupný obsah 7">
+            <a:extLst>
+              <a:ext uri="{FF2B5EF4-FFF2-40B4-BE49-F238E27FC236}">
+                <a16:creationId xmlns:a16="http://schemas.microsoft.com/office/drawing/2014/main" id="{74D53889-CE4D-4E41-8305-EEFBEDEF1603}"/>
+              </a:ext>
+            </a:extLst>
+          </p:cNvPr>
+          <p:cNvSpPr>
+            <a:spLocks noGrp="1"/>
+          </p:cNvSpPr>
+          <p:nvPr>
+            <p:ph sz="half" idx="1"/>
+          </p:nvPr>
+        </p:nvSpPr>
+        <p:spPr/>
+        <p:txBody>
+          <a:bodyPr>
+            <a:normAutofit/>
+          </a:bodyPr>
+          <a:lstStyle/>
+          <a:p>
+            <a:r>
+              <a:rPr lang="cs-CZ" u="sng" dirty="0"/>
+              <a:t>Funkční online portál pro redakci:</a:t>
+            </a:r>
+          </a:p>
+          <a:p>
+            <a:pPr lvl="1">
+              <a:buFont typeface="Arial" panose="020B0604020202020204" pitchFamily="34" charset="0"/>
+              <a:buChar char="•"/>
+            </a:pPr>
+            <a:r>
+              <a:rPr lang="cs-CZ" dirty="0"/>
+              <a:t>Aplikace je dostupná na všech prohlížečích</a:t>
+            </a:r>
+          </a:p>
+          <a:p>
+            <a:pPr lvl="1">
+              <a:buFont typeface="Arial" panose="020B0604020202020204" pitchFamily="34" charset="0"/>
+              <a:buChar char="•"/>
+            </a:pPr>
+            <a:r>
+              <a:rPr lang="cs-CZ" dirty="0"/>
+              <a:t>Unit testy</a:t>
+            </a:r>
+          </a:p>
+          <a:p>
+            <a:pPr lvl="1">
+              <a:buFont typeface="Arial" panose="020B0604020202020204" pitchFamily="34" charset="0"/>
+              <a:buChar char="•"/>
+            </a:pPr>
+            <a:r>
+              <a:rPr lang="cs-CZ" dirty="0"/>
+              <a:t>Akceptační testování</a:t>
+            </a:r>
+          </a:p>
+          <a:p>
+            <a:pPr lvl="1">
+              <a:buFont typeface="Arial" panose="020B0604020202020204" pitchFamily="34" charset="0"/>
+              <a:buChar char="•"/>
+            </a:pPr>
+            <a:r>
+              <a:rPr lang="cs-CZ" dirty="0"/>
+              <a:t>Automatizované nasazení aplikace</a:t>
+            </a:r>
+          </a:p>
+          <a:p>
+            <a:pPr lvl="1">
+              <a:buFont typeface="Arial" panose="020B0604020202020204" pitchFamily="34" charset="0"/>
+              <a:buChar char="•"/>
+            </a:pPr>
+            <a:r>
+              <a:rPr lang="cs-CZ" dirty="0"/>
+              <a:t>Kód aplikace prošel </a:t>
+            </a:r>
+            <a:r>
+              <a:rPr lang="cs-CZ" dirty="0" err="1"/>
+              <a:t>code</a:t>
+            </a:r>
+            <a:r>
+              <a:rPr lang="cs-CZ" dirty="0"/>
+              <a:t> </a:t>
+            </a:r>
+            <a:r>
+              <a:rPr lang="cs-CZ" dirty="0" err="1"/>
+              <a:t>review</a:t>
+            </a:r>
+            <a:endParaRPr lang="cs-CZ" dirty="0"/>
+          </a:p>
+          <a:p>
+            <a:pPr lvl="1">
+              <a:buFont typeface="Arial" panose="020B0604020202020204" pitchFamily="34" charset="0"/>
+              <a:buChar char="•"/>
+            </a:pPr>
+            <a:r>
+              <a:rPr lang="cs-CZ" dirty="0"/>
+              <a:t>Odezva aplikace je přijatelná dle SLA</a:t>
+            </a:r>
+          </a:p>
+          <a:p>
+            <a:pPr lvl="1">
+              <a:buFont typeface="Arial" panose="020B0604020202020204" pitchFamily="34" charset="0"/>
+              <a:buChar char="•"/>
+            </a:pPr>
+            <a:r>
+              <a:rPr lang="cs-CZ" dirty="0"/>
+              <a:t>Aplikace splňuje </a:t>
+            </a:r>
+            <a:r>
+              <a:rPr lang="cs-CZ" dirty="0" err="1"/>
+              <a:t>Owasp</a:t>
+            </a:r>
+            <a:r>
+              <a:rPr lang="cs-CZ" dirty="0"/>
+              <a:t> (bezpečnostní certifikaci)</a:t>
+            </a:r>
+          </a:p>
+          <a:p>
+            <a:pPr lvl="1">
+              <a:buFont typeface="Arial" panose="020B0604020202020204" pitchFamily="34" charset="0"/>
+              <a:buChar char="•"/>
+            </a:pPr>
+            <a:r>
+              <a:rPr lang="cs-CZ" sz="1800" dirty="0"/>
+              <a:t>Budou se dále přidávat další</a:t>
+            </a:r>
+            <a:br>
+              <a:rPr lang="cs-CZ" dirty="0"/>
+            </a:br>
+            <a:endParaRPr lang="cs-CZ" dirty="0"/>
+          </a:p>
+        </p:txBody>
+      </p:sp>
+    </p:spTree>
+    <p:extLst>
+      <p:ext uri="{BB962C8B-B14F-4D97-AF65-F5344CB8AC3E}">
+        <p14:creationId xmlns:p14="http://schemas.microsoft.com/office/powerpoint/2010/main" val="889526983"/>
       </p:ext>
     </p:extLst>
   </p:cSld>
@@ -6633,8 +6295,17 @@
 </file>
 
 <file path=customXml/item1.xml><?xml version="1.0" encoding="utf-8"?>
-<ct:contentTypeSchema xmlns:ct="http://schemas.microsoft.com/office/2006/metadata/contentType" xmlns:ma="http://schemas.microsoft.com/office/2006/metadata/properties/metaAttributes" ct:_="" ma:_="" ma:contentTypeName="Dokument" ma:contentTypeID="0x0101004F7B6DC845F01641AC1819E233C32348" ma:contentTypeVersion="5" ma:contentTypeDescription="Vytvoří nový dokument" ma:contentTypeScope="" ma:versionID="c1d2c7b1127c339cd806c3750c34a985">
-  <xsd:schema xmlns:xsd="http://www.w3.org/2001/XMLSchema" xmlns:xs="http://www.w3.org/2001/XMLSchema" xmlns:p="http://schemas.microsoft.com/office/2006/metadata/properties" xmlns:ns2="257ed0fd-0c01-4892-a7d0-e889d1c5a7c5" targetNamespace="http://schemas.microsoft.com/office/2006/metadata/properties" ma:root="true" ma:fieldsID="fc87a3815442ffbf45acfcc89d704beb" ns2:_="">
+<?mso-contentType ?>
+<FormTemplates xmlns="http://schemas.microsoft.com/sharepoint/v3/contenttype/forms">
+  <Display>DocumentLibraryForm</Display>
+  <Edit>DocumentLibraryForm</Edit>
+  <New>DocumentLibraryForm</New>
+</FormTemplates>
+</file>
+
+<file path=customXml/item2.xml><?xml version="1.0" encoding="utf-8"?>
+<ct:contentTypeSchema xmlns:ct="http://schemas.microsoft.com/office/2006/metadata/contentType" xmlns:ma="http://schemas.microsoft.com/office/2006/metadata/properties/metaAttributes" ct:_="" ma:_="" ma:contentTypeName="Dokument" ma:contentTypeID="0x0101004F7B6DC845F01641AC1819E233C32348" ma:contentTypeVersion="8" ma:contentTypeDescription="Vytvoří nový dokument" ma:contentTypeScope="" ma:versionID="089607b9f5852e8d3b95fd6932b656f4">
+  <xsd:schema xmlns:xsd="http://www.w3.org/2001/XMLSchema" xmlns:xs="http://www.w3.org/2001/XMLSchema" xmlns:p="http://schemas.microsoft.com/office/2006/metadata/properties" xmlns:ns2="257ed0fd-0c01-4892-a7d0-e889d1c5a7c5" targetNamespace="http://schemas.microsoft.com/office/2006/metadata/properties" ma:root="true" ma:fieldsID="8e9d2cb3255978abc8c7e127f83fb43d" ns2:_="">
     <xsd:import namespace="257ed0fd-0c01-4892-a7d0-e889d1c5a7c5"/>
     <xsd:element name="properties">
       <xsd:complexType>
@@ -6647,6 +6318,9 @@
                 <xsd:element ref="ns2:MediaServiceAutoTags" minOccurs="0"/>
                 <xsd:element ref="ns2:MediaServiceGenerationTime" minOccurs="0"/>
                 <xsd:element ref="ns2:MediaServiceEventHashCode" minOccurs="0"/>
+                <xsd:element ref="ns2:MediaServiceDateTaken" minOccurs="0"/>
+                <xsd:element ref="ns2:MediaServiceLocation" minOccurs="0"/>
+                <xsd:element ref="ns2:MediaServiceOCR" minOccurs="0"/>
               </xsd:all>
             </xsd:complexType>
           </xsd:element>
@@ -6680,6 +6354,23 @@
     <xsd:element name="MediaServiceEventHashCode" ma:index="12" nillable="true" ma:displayName="MediaServiceEventHashCode" ma:hidden="true" ma:internalName="MediaServiceEventHashCode" ma:readOnly="true">
       <xsd:simpleType>
         <xsd:restriction base="dms:Text"/>
+      </xsd:simpleType>
+    </xsd:element>
+    <xsd:element name="MediaServiceDateTaken" ma:index="13" nillable="true" ma:displayName="MediaServiceDateTaken" ma:hidden="true" ma:internalName="MediaServiceDateTaken" ma:readOnly="true">
+      <xsd:simpleType>
+        <xsd:restriction base="dms:Text"/>
+      </xsd:simpleType>
+    </xsd:element>
+    <xsd:element name="MediaServiceLocation" ma:index="14" nillable="true" ma:displayName="Location" ma:internalName="MediaServiceLocation" ma:readOnly="true">
+      <xsd:simpleType>
+        <xsd:restriction base="dms:Text"/>
+      </xsd:simpleType>
+    </xsd:element>
+    <xsd:element name="MediaServiceOCR" ma:index="15" nillable="true" ma:displayName="Extracted Text" ma:internalName="MediaServiceOCR" ma:readOnly="true">
+      <xsd:simpleType>
+        <xsd:restriction base="dms:Note">
+          <xsd:maxLength value="255"/>
+        </xsd:restriction>
       </xsd:simpleType>
     </xsd:element>
   </xsd:schema>
@@ -6782,23 +6473,22 @@
 </ct:contentTypeSchema>
 </file>
 
-<file path=customXml/item2.xml><?xml version="1.0" encoding="utf-8"?>
+<file path=customXml/item3.xml><?xml version="1.0" encoding="utf-8"?>
 <p:properties xmlns:p="http://schemas.microsoft.com/office/2006/metadata/properties" xmlns:xsi="http://www.w3.org/2001/XMLSchema-instance" xmlns:pc="http://schemas.microsoft.com/office/infopath/2007/PartnerControls">
   <documentManagement/>
 </p:properties>
 </file>
 
-<file path=customXml/item3.xml><?xml version="1.0" encoding="utf-8"?>
-<?mso-contentType ?>
-<FormTemplates xmlns="http://schemas.microsoft.com/sharepoint/v3/contenttype/forms">
-  <Display>DocumentLibraryForm</Display>
-  <Edit>DocumentLibraryForm</Edit>
-  <New>DocumentLibraryForm</New>
-</FormTemplates>
+<file path=customXml/itemProps1.xml><?xml version="1.0" encoding="utf-8"?>
+<ds:datastoreItem xmlns:ds="http://schemas.openxmlformats.org/officeDocument/2006/customXml" ds:itemID="{06342019-296D-4624-BDAD-F843586D50E0}">
+  <ds:schemaRefs>
+    <ds:schemaRef ds:uri="http://schemas.microsoft.com/sharepoint/v3/contenttype/forms"/>
+  </ds:schemaRefs>
+</ds:datastoreItem>
 </file>
 
-<file path=customXml/itemProps1.xml><?xml version="1.0" encoding="utf-8"?>
-<ds:datastoreItem xmlns:ds="http://schemas.openxmlformats.org/officeDocument/2006/customXml" ds:itemID="{FE9481B9-8C1C-4B24-B9D2-A650B5313124}">
+<file path=customXml/itemProps2.xml><?xml version="1.0" encoding="utf-8"?>
+<ds:datastoreItem xmlns:ds="http://schemas.openxmlformats.org/officeDocument/2006/customXml" ds:itemID="{BE44B78F-A1CB-48E9-8AEF-AE646203AA12}">
   <ds:schemaRefs>
     <ds:schemaRef ds:uri="257ed0fd-0c01-4892-a7d0-e889d1c5a7c5"/>
     <ds:schemaRef ds:uri="http://purl.org/dc/elements/1.1/"/>
@@ -6815,19 +6505,18 @@
 </ds:datastoreItem>
 </file>
 
-<file path=customXml/itemProps2.xml><?xml version="1.0" encoding="utf-8"?>
+<file path=customXml/itemProps3.xml><?xml version="1.0" encoding="utf-8"?>
 <ds:datastoreItem xmlns:ds="http://schemas.openxmlformats.org/officeDocument/2006/customXml" ds:itemID="{F943AD3E-42E7-48D0-8614-99145EFE2DAA}">
   <ds:schemaRefs>
+    <ds:schemaRef ds:uri="http://purl.org/dc/elements/1.1/"/>
     <ds:schemaRef ds:uri="http://schemas.microsoft.com/office/2006/metadata/properties"/>
+    <ds:schemaRef ds:uri="257ed0fd-0c01-4892-a7d0-e889d1c5a7c5"/>
+    <ds:schemaRef ds:uri="http://purl.org/dc/terms/"/>
+    <ds:schemaRef ds:uri="http://schemas.microsoft.com/office/2006/documentManagement/types"/>
+    <ds:schemaRef ds:uri="http://purl.org/dc/dcmitype/"/>
     <ds:schemaRef ds:uri="http://schemas.microsoft.com/office/infopath/2007/PartnerControls"/>
-  </ds:schemaRefs>
-</ds:datastoreItem>
-</file>
-
-<file path=customXml/itemProps3.xml><?xml version="1.0" encoding="utf-8"?>
-<ds:datastoreItem xmlns:ds="http://schemas.openxmlformats.org/officeDocument/2006/customXml" ds:itemID="{06342019-296D-4624-BDAD-F843586D50E0}">
-  <ds:schemaRefs>
-    <ds:schemaRef ds:uri="http://schemas.microsoft.com/sharepoint/v3/contenttype/forms"/>
+    <ds:schemaRef ds:uri="http://schemas.openxmlformats.org/package/2006/metadata/core-properties"/>
+    <ds:schemaRef ds:uri="http://www.w3.org/XML/1998/namespace"/>
   </ds:schemaRefs>
 </ds:datastoreItem>
 </file>
</xml_diff>